<commit_message>
add implementation and conclusion slides
</commit_message>
<xml_diff>
--- a/Алгоритм сжатия цветков.pptx
+++ b/Алгоритм сжатия цветков.pptx
@@ -6,7 +6,7 @@
     <p:sldMasterId id="2147483671" r:id="rId2"/>
   </p:sldMasterIdLst>
   <p:notesMasterIdLst>
-    <p:notesMasterId r:id="rId13"/>
+    <p:notesMasterId r:id="rId15"/>
   </p:notesMasterIdLst>
   <p:sldIdLst>
     <p:sldId id="274" r:id="rId3"/>
@@ -19,46 +19,48 @@
     <p:sldId id="333" r:id="rId10"/>
     <p:sldId id="334" r:id="rId11"/>
     <p:sldId id="315" r:id="rId12"/>
+    <p:sldId id="336" r:id="rId13"/>
+    <p:sldId id="335" r:id="rId14"/>
   </p:sldIdLst>
   <p:sldSz cx="12192000" cy="6858000"/>
   <p:notesSz cx="7010400" cy="9296400"/>
   <p:embeddedFontLst>
     <p:embeddedFont>
-      <p:font typeface="Cambria Math" panose="02040503050406030204" pitchFamily="18" charset="0"/>
-      <p:regular r:id="rId14"/>
+      <p:font typeface="Raleway" panose="020B0003030101060003" pitchFamily="34" charset="0"/>
+      <p:regular r:id="rId16"/>
+      <p:bold r:id="rId17"/>
+      <p:italic r:id="rId18"/>
+      <p:boldItalic r:id="rId19"/>
+    </p:embeddedFont>
+    <p:embeddedFont>
+      <p:font typeface="Calibri" panose="020F0502020204030204" pitchFamily="34" charset="0"/>
+      <p:regular r:id="rId20"/>
+      <p:bold r:id="rId21"/>
+      <p:italic r:id="rId22"/>
+      <p:boldItalic r:id="rId23"/>
+    </p:embeddedFont>
+    <p:embeddedFont>
+      <p:font typeface="Roboto" panose="020B0604020202020204" charset="0"/>
+      <p:regular r:id="rId24"/>
+      <p:bold r:id="rId25"/>
+      <p:italic r:id="rId26"/>
+      <p:boldItalic r:id="rId27"/>
     </p:embeddedFont>
     <p:embeddedFont>
       <p:font typeface="Roboto Light" panose="020B0604020202020204" charset="0"/>
-      <p:regular r:id="rId15"/>
-      <p:italic r:id="rId16"/>
+      <p:regular r:id="rId28"/>
+      <p:italic r:id="rId29"/>
     </p:embeddedFont>
     <p:embeddedFont>
-      <p:font typeface="Roboto" panose="020B0604020202020204" charset="0"/>
-      <p:regular r:id="rId17"/>
-      <p:bold r:id="rId18"/>
-      <p:italic r:id="rId19"/>
-      <p:boldItalic r:id="rId20"/>
+      <p:font typeface="Cambria Math" panose="02040503050406030204" pitchFamily="18" charset="0"/>
+      <p:regular r:id="rId30"/>
     </p:embeddedFont>
     <p:embeddedFont>
       <p:font typeface="Montserrat" panose="020B0604020202020204" charset="-52"/>
-      <p:regular r:id="rId21"/>
-      <p:bold r:id="rId22"/>
-      <p:italic r:id="rId23"/>
-      <p:boldItalic r:id="rId24"/>
-    </p:embeddedFont>
-    <p:embeddedFont>
-      <p:font typeface="Calibri" panose="020F0502020204030204" pitchFamily="34" charset="0"/>
-      <p:regular r:id="rId25"/>
-      <p:bold r:id="rId26"/>
-      <p:italic r:id="rId27"/>
-      <p:boldItalic r:id="rId28"/>
-    </p:embeddedFont>
-    <p:embeddedFont>
-      <p:font typeface="Raleway" panose="020B0003030101060003" pitchFamily="34" charset="0"/>
-      <p:regular r:id="rId29"/>
-      <p:bold r:id="rId30"/>
-      <p:italic r:id="rId31"/>
-      <p:boldItalic r:id="rId32"/>
+      <p:regular r:id="rId31"/>
+      <p:bold r:id="rId32"/>
+      <p:italic r:id="rId33"/>
+      <p:boldItalic r:id="rId34"/>
     </p:embeddedFont>
   </p:embeddedFontLst>
   <p:defaultTextStyle>
@@ -22460,6 +22462,13 @@
   <p:clrMapOvr>
     <a:masterClrMapping/>
   </p:clrMapOvr>
+  <p:timing>
+    <p:tnLst>
+      <p:par>
+        <p:cTn id="1" dur="indefinite" restart="never" nodeType="tmRoot"/>
+      </p:par>
+    </p:tnLst>
+  </p:timing>
 </p:sld>
 </file>
 
@@ -22482,193 +22491,6 @@
       </p:grpSpPr>
       <p:sp>
         <p:nvSpPr>
-          <p:cNvPr id="88" name="Google Shape;183;p17">
-            <a:extLst>
-              <a:ext uri="{FF2B5EF4-FFF2-40B4-BE49-F238E27FC236}">
-                <a16:creationId xmlns:a16="http://schemas.microsoft.com/office/drawing/2014/main" id="{41490EAB-5150-4794-AC04-C2E6F6A70238}"/>
-              </a:ext>
-            </a:extLst>
-          </p:cNvPr>
-          <p:cNvSpPr/>
-          <p:nvPr/>
-        </p:nvSpPr>
-        <p:spPr>
-          <a:xfrm>
-            <a:off x="1797" y="2383193"/>
-            <a:ext cx="2199265" cy="548466"/>
-          </a:xfrm>
-          <a:custGeom>
-            <a:avLst/>
-            <a:gdLst>
-              <a:gd name="connsiteX0" fmla="*/ 0 w 1645921"/>
-              <a:gd name="connsiteY0" fmla="*/ 0 h 391481"/>
-              <a:gd name="connsiteX1" fmla="*/ 1450181 w 1645921"/>
-              <a:gd name="connsiteY1" fmla="*/ 0 h 391481"/>
-              <a:gd name="connsiteX2" fmla="*/ 1645921 w 1645921"/>
-              <a:gd name="connsiteY2" fmla="*/ 195741 h 391481"/>
-              <a:gd name="connsiteX3" fmla="*/ 1450181 w 1645921"/>
-              <a:gd name="connsiteY3" fmla="*/ 391481 h 391481"/>
-              <a:gd name="connsiteX4" fmla="*/ 0 w 1645921"/>
-              <a:gd name="connsiteY4" fmla="*/ 391481 h 391481"/>
-              <a:gd name="connsiteX5" fmla="*/ 195741 w 1645921"/>
-              <a:gd name="connsiteY5" fmla="*/ 195741 h 391481"/>
-              <a:gd name="connsiteX6" fmla="*/ 0 w 1645921"/>
-              <a:gd name="connsiteY6" fmla="*/ 0 h 391481"/>
-              <a:gd name="connsiteX0" fmla="*/ 17619 w 1663540"/>
-              <a:gd name="connsiteY0" fmla="*/ 0 h 391481"/>
-              <a:gd name="connsiteX1" fmla="*/ 1467800 w 1663540"/>
-              <a:gd name="connsiteY1" fmla="*/ 0 h 391481"/>
-              <a:gd name="connsiteX2" fmla="*/ 1663540 w 1663540"/>
-              <a:gd name="connsiteY2" fmla="*/ 195741 h 391481"/>
-              <a:gd name="connsiteX3" fmla="*/ 1467800 w 1663540"/>
-              <a:gd name="connsiteY3" fmla="*/ 391481 h 391481"/>
-              <a:gd name="connsiteX4" fmla="*/ 17619 w 1663540"/>
-              <a:gd name="connsiteY4" fmla="*/ 391481 h 391481"/>
-              <a:gd name="connsiteX5" fmla="*/ 0 w 1663540"/>
-              <a:gd name="connsiteY5" fmla="*/ 195741 h 391481"/>
-              <a:gd name="connsiteX6" fmla="*/ 17619 w 1663540"/>
-              <a:gd name="connsiteY6" fmla="*/ 0 h 391481"/>
-              <a:gd name="connsiteX0" fmla="*/ 0 w 1645921"/>
-              <a:gd name="connsiteY0" fmla="*/ 0 h 391481"/>
-              <a:gd name="connsiteX1" fmla="*/ 1450181 w 1645921"/>
-              <a:gd name="connsiteY1" fmla="*/ 0 h 391481"/>
-              <a:gd name="connsiteX2" fmla="*/ 1645921 w 1645921"/>
-              <a:gd name="connsiteY2" fmla="*/ 195741 h 391481"/>
-              <a:gd name="connsiteX3" fmla="*/ 1450181 w 1645921"/>
-              <a:gd name="connsiteY3" fmla="*/ 391481 h 391481"/>
-              <a:gd name="connsiteX4" fmla="*/ 0 w 1645921"/>
-              <a:gd name="connsiteY4" fmla="*/ 391481 h 391481"/>
-              <a:gd name="connsiteX5" fmla="*/ 71281 w 1645921"/>
-              <a:gd name="connsiteY5" fmla="*/ 192566 h 391481"/>
-              <a:gd name="connsiteX6" fmla="*/ 0 w 1645921"/>
-              <a:gd name="connsiteY6" fmla="*/ 0 h 391481"/>
-              <a:gd name="connsiteX0" fmla="*/ 1744 w 1647665"/>
-              <a:gd name="connsiteY0" fmla="*/ 0 h 391481"/>
-              <a:gd name="connsiteX1" fmla="*/ 1451925 w 1647665"/>
-              <a:gd name="connsiteY1" fmla="*/ 0 h 391481"/>
-              <a:gd name="connsiteX2" fmla="*/ 1647665 w 1647665"/>
-              <a:gd name="connsiteY2" fmla="*/ 195741 h 391481"/>
-              <a:gd name="connsiteX3" fmla="*/ 1451925 w 1647665"/>
-              <a:gd name="connsiteY3" fmla="*/ 391481 h 391481"/>
-              <a:gd name="connsiteX4" fmla="*/ 1744 w 1647665"/>
-              <a:gd name="connsiteY4" fmla="*/ 391481 h 391481"/>
-              <a:gd name="connsiteX5" fmla="*/ 0 w 1647665"/>
-              <a:gd name="connsiteY5" fmla="*/ 189391 h 391481"/>
-              <a:gd name="connsiteX6" fmla="*/ 1744 w 1647665"/>
-              <a:gd name="connsiteY6" fmla="*/ 0 h 391481"/>
-            </a:gdLst>
-            <a:ahLst/>
-            <a:cxnLst>
-              <a:cxn ang="0">
-                <a:pos x="connsiteX0" y="connsiteY0"/>
-              </a:cxn>
-              <a:cxn ang="0">
-                <a:pos x="connsiteX1" y="connsiteY1"/>
-              </a:cxn>
-              <a:cxn ang="0">
-                <a:pos x="connsiteX2" y="connsiteY2"/>
-              </a:cxn>
-              <a:cxn ang="0">
-                <a:pos x="connsiteX3" y="connsiteY3"/>
-              </a:cxn>
-              <a:cxn ang="0">
-                <a:pos x="connsiteX4" y="connsiteY4"/>
-              </a:cxn>
-              <a:cxn ang="0">
-                <a:pos x="connsiteX5" y="connsiteY5"/>
-              </a:cxn>
-              <a:cxn ang="0">
-                <a:pos x="connsiteX6" y="connsiteY6"/>
-              </a:cxn>
-            </a:cxnLst>
-            <a:rect l="l" t="t" r="r" b="b"/>
-            <a:pathLst>
-              <a:path w="1647665" h="391481">
-                <a:moveTo>
-                  <a:pt x="1744" y="0"/>
-                </a:moveTo>
-                <a:lnTo>
-                  <a:pt x="1451925" y="0"/>
-                </a:lnTo>
-                <a:lnTo>
-                  <a:pt x="1647665" y="195741"/>
-                </a:lnTo>
-                <a:lnTo>
-                  <a:pt x="1451925" y="391481"/>
-                </a:lnTo>
-                <a:lnTo>
-                  <a:pt x="1744" y="391481"/>
-                </a:lnTo>
-                <a:cubicBezTo>
-                  <a:pt x="1163" y="324118"/>
-                  <a:pt x="581" y="256754"/>
-                  <a:pt x="0" y="189391"/>
-                </a:cubicBezTo>
-                <a:cubicBezTo>
-                  <a:pt x="581" y="126261"/>
-                  <a:pt x="1163" y="63130"/>
-                  <a:pt x="1744" y="0"/>
-                </a:cubicBezTo>
-                <a:close/>
-              </a:path>
-            </a:pathLst>
-          </a:custGeom>
-          <a:solidFill>
-            <a:srgbClr val="699BCD"/>
-          </a:solidFill>
-          <a:ln>
-            <a:noFill/>
-          </a:ln>
-        </p:spPr>
-        <p:txBody>
-          <a:bodyPr spcFirstLastPara="1" wrap="square" lIns="91425" tIns="91425" rIns="91425" bIns="91425" anchor="ctr" anchorCtr="0">
-            <a:noAutofit/>
-          </a:bodyPr>
-          <a:lstStyle/>
-          <a:p>
-            <a:pPr marL="0" marR="0" lvl="0" indent="0" algn="ctr" rtl="0">
-              <a:lnSpc>
-                <a:spcPct val="100000"/>
-              </a:lnSpc>
-              <a:spcBef>
-                <a:spcPts val="0"/>
-              </a:spcBef>
-              <a:spcAft>
-                <a:spcPts val="0"/>
-              </a:spcAft>
-              <a:buClr>
-                <a:srgbClr val="000000"/>
-              </a:buClr>
-              <a:buSzPts val="1400"/>
-              <a:buFont typeface="Arial"/>
-              <a:buNone/>
-            </a:pPr>
-            <a:r>
-              <a:rPr lang="ru-RU" sz="1200" b="1" dirty="0" smtClean="0">
-                <a:solidFill>
-                  <a:schemeClr val="lt1"/>
-                </a:solidFill>
-                <a:latin typeface="Montserrat"/>
-                <a:ea typeface="Montserrat"/>
-                <a:cs typeface="Montserrat"/>
-                <a:sym typeface="Montserrat"/>
-              </a:rPr>
-              <a:t>Исходный граф</a:t>
-            </a:r>
-            <a:endParaRPr lang="ru-RU" sz="1200" b="1" dirty="0">
-              <a:solidFill>
-                <a:schemeClr val="lt1"/>
-              </a:solidFill>
-              <a:latin typeface="Montserrat"/>
-              <a:ea typeface="Montserrat"/>
-              <a:cs typeface="Montserrat"/>
-              <a:sym typeface="Montserrat"/>
-            </a:endParaRPr>
-          </a:p>
-        </p:txBody>
-      </p:sp>
-      <p:sp>
-        <p:nvSpPr>
           <p:cNvPr id="96" name="Google Shape;189;p17">
             <a:extLst>
               <a:ext uri="{FF2B5EF4-FFF2-40B4-BE49-F238E27FC236}">
@@ -22681,8 +22503,8 @@
         </p:nvSpPr>
         <p:spPr>
           <a:xfrm>
-            <a:off x="2088391" y="2390110"/>
-            <a:ext cx="1989767" cy="548465"/>
+            <a:off x="2072030" y="1754075"/>
+            <a:ext cx="2116797" cy="663643"/>
           </a:xfrm>
           <a:prstGeom prst="chevron">
             <a:avLst>
@@ -22716,16 +22538,8 @@
               <a:buNone/>
             </a:pPr>
             <a:r>
-              <a:rPr lang="ru" sz="1200" dirty="0" smtClean="0">
-                <a:solidFill>
-                  <a:schemeClr val="dk1"/>
-                </a:solidFill>
-                <a:latin typeface="Montserrat"/>
-                <a:ea typeface="Montserrat"/>
-                <a:cs typeface="Montserrat"/>
-                <a:sym typeface="Montserrat"/>
-              </a:rPr>
-              <a:t>Сжатие первого цветка</a:t>
+              <a:rPr lang="ru-RU" sz="1200" dirty="0" smtClean="0"/>
+              <a:t>Поиск цветков</a:t>
             </a:r>
             <a:endParaRPr sz="1200" dirty="0"/>
           </a:p>
@@ -22745,8 +22559,8 @@
         </p:nvSpPr>
         <p:spPr>
           <a:xfrm>
-            <a:off x="3920005" y="2390109"/>
-            <a:ext cx="2100219" cy="548465"/>
+            <a:off x="4027876" y="1747262"/>
+            <a:ext cx="2100219" cy="663643"/>
           </a:xfrm>
           <a:prstGeom prst="chevron">
             <a:avLst>
@@ -22772,40 +22586,8 @@
           <a:p>
             <a:pPr lvl="0" algn="ctr"/>
             <a:r>
-              <a:rPr lang="ru-RU" sz="1200" dirty="0">
-                <a:solidFill>
-                  <a:schemeClr val="dk1"/>
-                </a:solidFill>
-                <a:latin typeface="Montserrat"/>
-                <a:ea typeface="Montserrat"/>
-                <a:cs typeface="Montserrat"/>
-                <a:sym typeface="Montserrat"/>
-              </a:rPr>
-              <a:t>Сжатие </a:t>
-            </a:r>
-            <a:r>
-              <a:rPr lang="ru-RU" sz="1200" dirty="0" smtClean="0">
-                <a:solidFill>
-                  <a:schemeClr val="dk1"/>
-                </a:solidFill>
-                <a:latin typeface="Montserrat"/>
-                <a:ea typeface="Montserrat"/>
-                <a:cs typeface="Montserrat"/>
-                <a:sym typeface="Montserrat"/>
-              </a:rPr>
-              <a:t>второго </a:t>
-            </a:r>
-            <a:r>
-              <a:rPr lang="ru-RU" sz="1200" dirty="0">
-                <a:solidFill>
-                  <a:schemeClr val="dk1"/>
-                </a:solidFill>
-                <a:latin typeface="Montserrat"/>
-                <a:ea typeface="Montserrat"/>
-                <a:cs typeface="Montserrat"/>
-                <a:sym typeface="Montserrat"/>
-              </a:rPr>
-              <a:t>цветка</a:t>
+              <a:rPr lang="ru-RU" sz="1200" dirty="0" smtClean="0"/>
+              <a:t>Сжатие цветков</a:t>
             </a:r>
             <a:endParaRPr lang="ru-RU" sz="1200" dirty="0"/>
           </a:p>
@@ -22825,8 +22607,8 @@
         </p:nvSpPr>
         <p:spPr>
           <a:xfrm>
-            <a:off x="5859631" y="2390109"/>
-            <a:ext cx="2133532" cy="548465"/>
+            <a:off x="5972220" y="1747262"/>
+            <a:ext cx="2133532" cy="663643"/>
           </a:xfrm>
           <a:prstGeom prst="chevron">
             <a:avLst>
@@ -22852,40 +22634,22 @@
           <a:p>
             <a:pPr lvl="0" algn="ctr"/>
             <a:r>
-              <a:rPr lang="ru-RU" sz="1200" dirty="0">
-                <a:solidFill>
-                  <a:schemeClr val="dk1"/>
-                </a:solidFill>
-                <a:latin typeface="Montserrat"/>
-                <a:ea typeface="Montserrat"/>
-                <a:cs typeface="Montserrat"/>
-                <a:sym typeface="Montserrat"/>
-              </a:rPr>
-              <a:t>Сжатие </a:t>
+              <a:rPr lang="ru-RU" sz="1200" dirty="0" smtClean="0"/>
+              <a:t>Нахождение</a:t>
             </a:r>
+            <a:br>
+              <a:rPr lang="ru-RU" sz="1200" dirty="0" smtClean="0"/>
+            </a:br>
             <a:r>
-              <a:rPr lang="ru-RU" sz="1200" dirty="0" smtClean="0">
-                <a:solidFill>
-                  <a:schemeClr val="dk1"/>
-                </a:solidFill>
-                <a:latin typeface="Montserrat"/>
-                <a:ea typeface="Montserrat"/>
-                <a:cs typeface="Montserrat"/>
-                <a:sym typeface="Montserrat"/>
-              </a:rPr>
-              <a:t>третьего </a:t>
+              <a:rPr lang="ru-RU" sz="1200" dirty="0" smtClean="0"/>
+              <a:t>дополняющего</a:t>
             </a:r>
+            <a:br>
+              <a:rPr lang="ru-RU" sz="1200" dirty="0" smtClean="0"/>
+            </a:br>
             <a:r>
-              <a:rPr lang="ru-RU" sz="1200" dirty="0">
-                <a:solidFill>
-                  <a:schemeClr val="dk1"/>
-                </a:solidFill>
-                <a:latin typeface="Montserrat"/>
-                <a:ea typeface="Montserrat"/>
-                <a:cs typeface="Montserrat"/>
-                <a:sym typeface="Montserrat"/>
-              </a:rPr>
-              <a:t>цветка</a:t>
+              <a:rPr lang="ru-RU" sz="1200" dirty="0" smtClean="0"/>
+              <a:t>пути</a:t>
             </a:r>
             <a:endParaRPr lang="ru-RU" sz="1200" dirty="0"/>
           </a:p>
@@ -22905,8 +22669,8 @@
         </p:nvSpPr>
         <p:spPr>
           <a:xfrm>
-            <a:off x="7913179" y="2383193"/>
-            <a:ext cx="2321673" cy="548465"/>
+            <a:off x="7911488" y="1747262"/>
+            <a:ext cx="2321673" cy="663643"/>
           </a:xfrm>
           <a:prstGeom prst="chevron">
             <a:avLst>
@@ -22940,14 +22704,8 @@
               <a:buNone/>
             </a:pPr>
             <a:r>
-              <a:rPr lang="ru-RU" sz="1200" dirty="0" smtClean="0">
-                <a:solidFill>
-                  <a:schemeClr val="dk1"/>
-                </a:solidFill>
-                <a:latin typeface="Montserrat"/>
-                <a:sym typeface="Montserrat"/>
-              </a:rPr>
-              <a:t>Инверсия дополняющего пути</a:t>
+              <a:rPr lang="ru-RU" sz="1200" dirty="0" smtClean="0"/>
+              <a:t>Восстановление графа</a:t>
             </a:r>
             <a:endParaRPr lang="ru-RU" sz="1200" dirty="0"/>
           </a:p>
@@ -22967,8 +22725,8 @@
         </p:nvSpPr>
         <p:spPr>
           <a:xfrm>
-            <a:off x="10058400" y="2390109"/>
-            <a:ext cx="2120796" cy="548465"/>
+            <a:off x="10050096" y="1754075"/>
+            <a:ext cx="2165548" cy="663643"/>
           </a:xfrm>
           <a:custGeom>
             <a:avLst/>
@@ -23215,7 +22973,30 @@
                 <a:cs typeface="Montserrat"/>
                 <a:sym typeface="Montserrat"/>
               </a:rPr>
-              <a:t>Восстановление графа</a:t>
+              <a:t>Максимальное</a:t>
+            </a:r>
+            <a:br>
+              <a:rPr lang="ru-RU" sz="1200" b="1" dirty="0" smtClean="0">
+                <a:solidFill>
+                  <a:schemeClr val="lt1"/>
+                </a:solidFill>
+                <a:latin typeface="Montserrat"/>
+                <a:ea typeface="Montserrat"/>
+                <a:cs typeface="Montserrat"/>
+                <a:sym typeface="Montserrat"/>
+              </a:rPr>
+            </a:br>
+            <a:r>
+              <a:rPr lang="ru-RU" sz="1200" b="1" dirty="0" smtClean="0">
+                <a:solidFill>
+                  <a:schemeClr val="lt1"/>
+                </a:solidFill>
+                <a:latin typeface="Montserrat"/>
+                <a:ea typeface="Montserrat"/>
+                <a:cs typeface="Montserrat"/>
+                <a:sym typeface="Montserrat"/>
+              </a:rPr>
+              <a:t>паросочетание</a:t>
             </a:r>
             <a:endParaRPr lang="ru-RU" sz="1200" b="1" dirty="0">
               <a:solidFill>
@@ -23225,62 +23006,6 @@
               <a:ea typeface="Montserrat"/>
               <a:cs typeface="Montserrat"/>
               <a:sym typeface="Montserrat"/>
-            </a:endParaRPr>
-          </a:p>
-        </p:txBody>
-      </p:sp>
-      <p:sp>
-        <p:nvSpPr>
-          <p:cNvPr id="42" name="Google Shape;154;gb6f6fa0e72_1_0"/>
-          <p:cNvSpPr/>
-          <p:nvPr/>
-        </p:nvSpPr>
-        <p:spPr>
-          <a:xfrm rot="5400000">
-            <a:off x="5387545" y="-5387546"/>
-            <a:ext cx="1416908" cy="12192001"/>
-          </a:xfrm>
-          <a:prstGeom prst="rect">
-            <a:avLst/>
-          </a:prstGeom>
-          <a:solidFill>
-            <a:srgbClr val="023A84"/>
-          </a:solidFill>
-          <a:ln>
-            <a:noFill/>
-          </a:ln>
-        </p:spPr>
-        <p:txBody>
-          <a:bodyPr spcFirstLastPara="1" wrap="square" lIns="91425" tIns="91425" rIns="91425" bIns="91425" anchor="ctr" anchorCtr="0">
-            <a:noAutofit/>
-          </a:bodyPr>
-          <a:lstStyle/>
-          <a:p>
-            <a:pPr marL="0" marR="0" lvl="0" indent="0" algn="ctr" rtl="0">
-              <a:lnSpc>
-                <a:spcPct val="100000"/>
-              </a:lnSpc>
-              <a:spcBef>
-                <a:spcPts val="0"/>
-              </a:spcBef>
-              <a:spcAft>
-                <a:spcPts val="0"/>
-              </a:spcAft>
-              <a:buClr>
-                <a:srgbClr val="000000"/>
-              </a:buClr>
-              <a:buSzPts val="1400"/>
-              <a:buFont typeface="Arial"/>
-              <a:buNone/>
-            </a:pPr>
-            <a:endParaRPr sz="1400" b="0" i="0" u="none" strike="noStrike" cap="none" dirty="0">
-              <a:solidFill>
-                <a:srgbClr val="000000"/>
-              </a:solidFill>
-              <a:latin typeface="+mj-lt"/>
-              <a:ea typeface="Arial"/>
-              <a:cs typeface="Arial"/>
-              <a:sym typeface="Arial"/>
             </a:endParaRPr>
           </a:p>
         </p:txBody>
@@ -23349,7 +23074,7 @@
         </p:nvSpPr>
         <p:spPr>
           <a:xfrm>
-            <a:off x="687602" y="1583583"/>
+            <a:off x="687602" y="564022"/>
             <a:ext cx="11124356" cy="584775"/>
           </a:xfrm>
           <a:prstGeom prst="rect">
@@ -23399,7 +23124,7 @@
         </p:nvSpPr>
         <p:spPr>
           <a:xfrm>
-            <a:off x="0" y="1338436"/>
+            <a:off x="0" y="298751"/>
             <a:ext cx="11616920" cy="298223"/>
           </a:xfrm>
           <a:prstGeom prst="rightArrow">
@@ -23462,7 +23187,7 @@
         </p:nvSpPr>
         <p:spPr>
           <a:xfrm>
-            <a:off x="3530651" y="4067379"/>
+            <a:off x="3555365" y="3910857"/>
             <a:ext cx="547507" cy="1337657"/>
           </a:xfrm>
           <a:prstGeom prst="chevron">
@@ -23528,7 +23253,7 @@
         </p:blipFill>
         <p:spPr>
           <a:xfrm>
-            <a:off x="0" y="3568007"/>
+            <a:off x="0" y="3411485"/>
             <a:ext cx="3524707" cy="2670233"/>
           </a:xfrm>
           <a:prstGeom prst="rect">
@@ -23557,7 +23282,7 @@
         </p:blipFill>
         <p:spPr>
           <a:xfrm>
-            <a:off x="4078158" y="3948125"/>
+            <a:off x="4078158" y="3791603"/>
             <a:ext cx="3491345" cy="1920241"/>
           </a:xfrm>
           <a:prstGeom prst="rect">
@@ -23579,7 +23304,7 @@
         </p:nvSpPr>
         <p:spPr>
           <a:xfrm>
-            <a:off x="7719409" y="4067378"/>
+            <a:off x="7719409" y="3910856"/>
             <a:ext cx="547507" cy="1337657"/>
           </a:xfrm>
           <a:prstGeom prst="chevron">
@@ -23645,7 +23370,7 @@
         </p:blipFill>
         <p:spPr>
           <a:xfrm>
-            <a:off x="8492633" y="3688080"/>
+            <a:off x="8492633" y="3531558"/>
             <a:ext cx="3484438" cy="2651760"/>
           </a:xfrm>
           <a:prstGeom prst="rect">
@@ -23653,6 +23378,131 @@
           </a:prstGeom>
         </p:spPr>
       </p:pic>
+      <p:sp>
+        <p:nvSpPr>
+          <p:cNvPr id="18" name="Google Shape;189;p17">
+            <a:extLst>
+              <a:ext uri="{FF2B5EF4-FFF2-40B4-BE49-F238E27FC236}">
+                <a16:creationId xmlns:a16="http://schemas.microsoft.com/office/drawing/2014/main" id="{DBCB4C86-74B2-4404-AB28-075B6BC508AA}"/>
+              </a:ext>
+            </a:extLst>
+          </p:cNvPr>
+          <p:cNvSpPr/>
+          <p:nvPr/>
+        </p:nvSpPr>
+        <p:spPr>
+          <a:xfrm>
+            <a:off x="-342947" y="1754075"/>
+            <a:ext cx="2587430" cy="663643"/>
+          </a:xfrm>
+          <a:prstGeom prst="chevron">
+            <a:avLst>
+              <a:gd name="adj" fmla="val 50000"/>
+            </a:avLst>
+          </a:prstGeom>
+          <a:solidFill>
+            <a:srgbClr val="699BCD"/>
+          </a:solidFill>
+          <a:ln w="9525" cap="flat" cmpd="sng">
+            <a:noFill/>
+            <a:prstDash val="solid"/>
+            <a:round/>
+            <a:headEnd type="none" w="sm" len="sm"/>
+            <a:tailEnd type="none" w="sm" len="sm"/>
+          </a:ln>
+        </p:spPr>
+        <p:txBody>
+          <a:bodyPr spcFirstLastPara="1" wrap="square" lIns="91425" tIns="91425" rIns="91425" bIns="91425" anchor="ctr" anchorCtr="0">
+            <a:noAutofit/>
+          </a:bodyPr>
+          <a:lstStyle/>
+          <a:p>
+            <a:pPr marL="0" lvl="0" indent="0" algn="ctr" rtl="0">
+              <a:spcBef>
+                <a:spcPts val="0"/>
+              </a:spcBef>
+              <a:spcAft>
+                <a:spcPts val="0"/>
+              </a:spcAft>
+              <a:buNone/>
+            </a:pPr>
+            <a:r>
+              <a:rPr lang="ru-RU" sz="1200" b="1" dirty="0" smtClean="0">
+                <a:solidFill>
+                  <a:schemeClr val="bg1"/>
+                </a:solidFill>
+              </a:rPr>
+              <a:t>Произвольный </a:t>
+            </a:r>
+          </a:p>
+          <a:p>
+            <a:pPr marL="0" lvl="0" indent="0" algn="ctr" rtl="0">
+              <a:spcBef>
+                <a:spcPts val="0"/>
+              </a:spcBef>
+              <a:spcAft>
+                <a:spcPts val="0"/>
+              </a:spcAft>
+              <a:buNone/>
+            </a:pPr>
+            <a:r>
+              <a:rPr lang="ru-RU" sz="1200" b="1" dirty="0" smtClean="0">
+                <a:solidFill>
+                  <a:schemeClr val="bg1"/>
+                </a:solidFill>
+              </a:rPr>
+              <a:t>граф</a:t>
+            </a:r>
+            <a:endParaRPr sz="1200" b="1" dirty="0">
+              <a:solidFill>
+                <a:schemeClr val="bg1"/>
+              </a:solidFill>
+            </a:endParaRPr>
+          </a:p>
+        </p:txBody>
+      </p:sp>
+      <p:sp>
+        <p:nvSpPr>
+          <p:cNvPr id="19" name="Прямоугольник 18">
+            <a:extLst>
+              <a:ext uri="{FF2B5EF4-FFF2-40B4-BE49-F238E27FC236}">
+                <a16:creationId xmlns:a16="http://schemas.microsoft.com/office/drawing/2014/main" id="{51EB4197-7888-4B6B-A423-9EFFA379FE9E}"/>
+              </a:ext>
+            </a:extLst>
+          </p:cNvPr>
+          <p:cNvSpPr/>
+          <p:nvPr/>
+        </p:nvSpPr>
+        <p:spPr>
+          <a:xfrm>
+            <a:off x="180975" y="6366139"/>
+            <a:ext cx="506627" cy="338554"/>
+          </a:xfrm>
+          <a:prstGeom prst="rect">
+            <a:avLst/>
+          </a:prstGeom>
+        </p:spPr>
+        <p:txBody>
+          <a:bodyPr wrap="square">
+            <a:spAutoFit/>
+          </a:bodyPr>
+          <a:lstStyle/>
+          <a:p>
+            <a:pPr lvl="0"/>
+            <a:r>
+              <a:rPr lang="ru-RU" sz="1600" b="1" dirty="0" smtClean="0">
+                <a:solidFill>
+                  <a:srgbClr val="023A84"/>
+                </a:solidFill>
+                <a:latin typeface="+mj-lt"/>
+                <a:ea typeface="Roboto" pitchFamily="2" charset="0"/>
+                <a:sym typeface="Calibri"/>
+              </a:rPr>
+              <a:t>10</a:t>
+            </a:r>
+          </a:p>
+        </p:txBody>
+      </p:sp>
     </p:spTree>
     <p:extLst>
       <p:ext uri="{BB962C8B-B14F-4D97-AF65-F5344CB8AC3E}">
@@ -23663,6 +23513,1442 @@
   <p:clrMapOvr>
     <a:masterClrMapping/>
   </p:clrMapOvr>
+  <p:timing>
+    <p:tnLst>
+      <p:par>
+        <p:cTn id="1" dur="indefinite" restart="never" nodeType="tmRoot"/>
+      </p:par>
+    </p:tnLst>
+  </p:timing>
+</p:sld>
+</file>
+
+<file path=ppt/slides/slide11.xml><?xml version="1.0" encoding="utf-8"?>
+<p:sld xmlns:a="http://schemas.openxmlformats.org/drawingml/2006/main" xmlns:r="http://schemas.openxmlformats.org/officeDocument/2006/relationships" xmlns:p="http://schemas.openxmlformats.org/presentationml/2006/main">
+  <p:cSld>
+    <p:spTree>
+      <p:nvGrpSpPr>
+        <p:cNvPr id="1" name=""/>
+        <p:cNvGrpSpPr/>
+        <p:nvPr/>
+      </p:nvGrpSpPr>
+      <p:grpSpPr>
+        <a:xfrm>
+          <a:off x="0" y="0"/>
+          <a:ext cx="0" cy="0"/>
+          <a:chOff x="0" y="0"/>
+          <a:chExt cx="0" cy="0"/>
+        </a:xfrm>
+      </p:grpSpPr>
+      <p:sp>
+        <p:nvSpPr>
+          <p:cNvPr id="11" name="Google Shape;116;p16">
+            <a:extLst>
+              <a:ext uri="{FF2B5EF4-FFF2-40B4-BE49-F238E27FC236}">
+                <a16:creationId xmlns:a16="http://schemas.microsoft.com/office/drawing/2014/main" id="{7AA952F0-A064-4726-955A-D3337EE6D9C4}"/>
+              </a:ext>
+            </a:extLst>
+          </p:cNvPr>
+          <p:cNvSpPr/>
+          <p:nvPr/>
+        </p:nvSpPr>
+        <p:spPr>
+          <a:xfrm>
+            <a:off x="518984" y="573544"/>
+            <a:ext cx="1458097" cy="1375719"/>
+          </a:xfrm>
+          <a:prstGeom prst="ellipse">
+            <a:avLst/>
+          </a:prstGeom>
+          <a:solidFill>
+            <a:srgbClr val="BBD6EE">
+              <a:alpha val="49410"/>
+            </a:srgbClr>
+          </a:solidFill>
+          <a:ln>
+            <a:noFill/>
+          </a:ln>
+        </p:spPr>
+        <p:txBody>
+          <a:bodyPr spcFirstLastPara="1" wrap="square" lIns="91425" tIns="45700" rIns="91425" bIns="45700" anchor="ctr" anchorCtr="0">
+            <a:noAutofit/>
+          </a:bodyPr>
+          <a:lstStyle/>
+          <a:p>
+            <a:pPr marL="0" marR="0" lvl="0" indent="0" algn="ctr" rtl="0">
+              <a:lnSpc>
+                <a:spcPct val="100000"/>
+              </a:lnSpc>
+              <a:spcBef>
+                <a:spcPts val="0"/>
+              </a:spcBef>
+              <a:spcAft>
+                <a:spcPts val="0"/>
+              </a:spcAft>
+              <a:buClr>
+                <a:srgbClr val="000000"/>
+              </a:buClr>
+              <a:buSzPts val="1800"/>
+              <a:buFont typeface="Arial"/>
+              <a:buNone/>
+            </a:pPr>
+            <a:endParaRPr sz="2400" b="0" i="0" u="none" strike="noStrike" cap="none">
+              <a:solidFill>
+                <a:srgbClr val="FFFFFF"/>
+              </a:solidFill>
+              <a:latin typeface="Calibri"/>
+              <a:ea typeface="Calibri"/>
+              <a:cs typeface="Calibri"/>
+              <a:sym typeface="Calibri"/>
+            </a:endParaRPr>
+          </a:p>
+        </p:txBody>
+      </p:sp>
+      <p:sp>
+        <p:nvSpPr>
+          <p:cNvPr id="10" name="Прямоугольник 9">
+            <a:extLst>
+              <a:ext uri="{FF2B5EF4-FFF2-40B4-BE49-F238E27FC236}">
+                <a16:creationId xmlns:a16="http://schemas.microsoft.com/office/drawing/2014/main" id="{51EB4197-7888-4B6B-A423-9EFFA379FE9E}"/>
+              </a:ext>
+            </a:extLst>
+          </p:cNvPr>
+          <p:cNvSpPr/>
+          <p:nvPr/>
+        </p:nvSpPr>
+        <p:spPr>
+          <a:xfrm>
+            <a:off x="916439" y="907268"/>
+            <a:ext cx="7337874" cy="830997"/>
+          </a:xfrm>
+          <a:prstGeom prst="rect">
+            <a:avLst/>
+          </a:prstGeom>
+        </p:spPr>
+        <p:txBody>
+          <a:bodyPr wrap="square">
+            <a:spAutoFit/>
+          </a:bodyPr>
+          <a:lstStyle/>
+          <a:p>
+            <a:pPr lvl="0"/>
+            <a:r>
+              <a:rPr lang="ru-RU" sz="4800" b="1" dirty="0" smtClean="0">
+                <a:solidFill>
+                  <a:srgbClr val="023A84"/>
+                </a:solidFill>
+                <a:latin typeface="+mj-lt"/>
+                <a:ea typeface="Roboto" pitchFamily="2" charset="0"/>
+                <a:sym typeface="Calibri"/>
+              </a:rPr>
+              <a:t>Описание реализации</a:t>
+            </a:r>
+            <a:endParaRPr lang="ru-RU" sz="4800" b="1" dirty="0">
+              <a:solidFill>
+                <a:srgbClr val="023A84"/>
+              </a:solidFill>
+              <a:latin typeface="+mj-lt"/>
+              <a:ea typeface="Roboto" pitchFamily="2" charset="0"/>
+              <a:sym typeface="Calibri"/>
+            </a:endParaRPr>
+          </a:p>
+        </p:txBody>
+      </p:sp>
+      <p:sp>
+        <p:nvSpPr>
+          <p:cNvPr id="15" name="Google Shape;95;p15">
+            <a:extLst>
+              <a:ext uri="{FF2B5EF4-FFF2-40B4-BE49-F238E27FC236}">
+                <a16:creationId xmlns:a16="http://schemas.microsoft.com/office/drawing/2014/main" id="{66A93B06-885B-49FF-849C-EB422071ECE9}"/>
+              </a:ext>
+            </a:extLst>
+          </p:cNvPr>
+          <p:cNvSpPr/>
+          <p:nvPr/>
+        </p:nvSpPr>
+        <p:spPr>
+          <a:xfrm>
+            <a:off x="0" y="110154"/>
+            <a:ext cx="11616920" cy="298223"/>
+          </a:xfrm>
+          <a:prstGeom prst="rightArrow">
+            <a:avLst>
+              <a:gd name="adj1" fmla="val 50000"/>
+              <a:gd name="adj2" fmla="val 50000"/>
+            </a:avLst>
+          </a:prstGeom>
+          <a:solidFill>
+            <a:schemeClr val="bg2">
+              <a:lumMod val="20000"/>
+              <a:lumOff val="80000"/>
+            </a:schemeClr>
+          </a:solidFill>
+          <a:ln>
+            <a:noFill/>
+          </a:ln>
+        </p:spPr>
+        <p:txBody>
+          <a:bodyPr spcFirstLastPara="1" wrap="square" lIns="91425" tIns="45700" rIns="91425" bIns="45700" anchor="ctr" anchorCtr="0">
+            <a:noAutofit/>
+          </a:bodyPr>
+          <a:lstStyle/>
+          <a:p>
+            <a:pPr marL="0" marR="0" lvl="0" indent="0" algn="ctr" rtl="0">
+              <a:lnSpc>
+                <a:spcPct val="100000"/>
+              </a:lnSpc>
+              <a:spcBef>
+                <a:spcPts val="0"/>
+              </a:spcBef>
+              <a:spcAft>
+                <a:spcPts val="0"/>
+              </a:spcAft>
+              <a:buNone/>
+            </a:pPr>
+            <a:endParaRPr sz="1600" b="0" i="0" u="none" strike="noStrike" cap="none">
+              <a:solidFill>
+                <a:schemeClr val="lt1"/>
+              </a:solidFill>
+              <a:latin typeface="+mj-lt"/>
+              <a:ea typeface="Arial"/>
+              <a:cs typeface="Arial"/>
+              <a:sym typeface="Arial"/>
+            </a:endParaRPr>
+          </a:p>
+        </p:txBody>
+      </p:sp>
+      <p:sp>
+        <p:nvSpPr>
+          <p:cNvPr id="14" name="Прямоугольник 13">
+            <a:extLst>
+              <a:ext uri="{FF2B5EF4-FFF2-40B4-BE49-F238E27FC236}">
+                <a16:creationId xmlns:a16="http://schemas.microsoft.com/office/drawing/2014/main" id="{51EB4197-7888-4B6B-A423-9EFFA379FE9E}"/>
+              </a:ext>
+            </a:extLst>
+          </p:cNvPr>
+          <p:cNvSpPr/>
+          <p:nvPr/>
+        </p:nvSpPr>
+        <p:spPr>
+          <a:xfrm>
+            <a:off x="180975" y="6366139"/>
+            <a:ext cx="338009" cy="338554"/>
+          </a:xfrm>
+          <a:prstGeom prst="rect">
+            <a:avLst/>
+          </a:prstGeom>
+        </p:spPr>
+        <p:txBody>
+          <a:bodyPr wrap="square">
+            <a:spAutoFit/>
+          </a:bodyPr>
+          <a:lstStyle/>
+          <a:p>
+            <a:pPr lvl="0"/>
+            <a:r>
+              <a:rPr lang="ru-RU" sz="1600" b="1" dirty="0">
+                <a:solidFill>
+                  <a:srgbClr val="023A84"/>
+                </a:solidFill>
+                <a:latin typeface="+mj-lt"/>
+                <a:ea typeface="Roboto" pitchFamily="2" charset="0"/>
+                <a:sym typeface="Calibri"/>
+              </a:rPr>
+              <a:t>9</a:t>
+            </a:r>
+            <a:endParaRPr lang="ru-RU" sz="1600" b="1" dirty="0" smtClean="0">
+              <a:solidFill>
+                <a:srgbClr val="023A84"/>
+              </a:solidFill>
+              <a:latin typeface="+mj-lt"/>
+              <a:ea typeface="Roboto" pitchFamily="2" charset="0"/>
+              <a:sym typeface="Calibri"/>
+            </a:endParaRPr>
+          </a:p>
+        </p:txBody>
+      </p:sp>
+      <p:sp>
+        <p:nvSpPr>
+          <p:cNvPr id="8" name="Прямоугольник 7">
+            <a:extLst>
+              <a:ext uri="{FF2B5EF4-FFF2-40B4-BE49-F238E27FC236}">
+                <a16:creationId xmlns:a16="http://schemas.microsoft.com/office/drawing/2014/main" id="{51EB4197-7888-4B6B-A423-9EFFA379FE9E}"/>
+              </a:ext>
+            </a:extLst>
+          </p:cNvPr>
+          <p:cNvSpPr/>
+          <p:nvPr/>
+        </p:nvSpPr>
+        <p:spPr>
+          <a:xfrm>
+            <a:off x="916439" y="2114431"/>
+            <a:ext cx="9709116" cy="3908762"/>
+          </a:xfrm>
+          <a:prstGeom prst="rect">
+            <a:avLst/>
+          </a:prstGeom>
+        </p:spPr>
+        <p:txBody>
+          <a:bodyPr wrap="square">
+            <a:spAutoFit/>
+          </a:bodyPr>
+          <a:lstStyle/>
+          <a:p>
+            <a:pPr lvl="0"/>
+            <a:r>
+              <a:rPr lang="ru-RU" sz="2400" b="1" dirty="0">
+                <a:solidFill>
+                  <a:srgbClr val="023A84"/>
+                </a:solidFill>
+                <a:latin typeface="+mj-lt"/>
+                <a:ea typeface="Roboto" pitchFamily="2" charset="0"/>
+                <a:sym typeface="Calibri"/>
+              </a:rPr>
+              <a:t>Написана библиотека </a:t>
+            </a:r>
+            <a:r>
+              <a:rPr lang="ru-RU" sz="2400" b="1" i="1" dirty="0" err="1" smtClean="0">
+                <a:solidFill>
+                  <a:srgbClr val="023A84"/>
+                </a:solidFill>
+                <a:latin typeface="+mj-lt"/>
+                <a:ea typeface="Roboto" pitchFamily="2" charset="0"/>
+                <a:sym typeface="Calibri"/>
+              </a:rPr>
+              <a:t>blossom.h</a:t>
+            </a:r>
+            <a:r>
+              <a:rPr lang="ru-RU" sz="2400" b="1" i="1" dirty="0" smtClean="0">
+                <a:solidFill>
+                  <a:srgbClr val="023A84"/>
+                </a:solidFill>
+                <a:latin typeface="+mj-lt"/>
+                <a:ea typeface="Roboto" pitchFamily="2" charset="0"/>
+                <a:sym typeface="Calibri"/>
+              </a:rPr>
+              <a:t> </a:t>
+            </a:r>
+            <a:r>
+              <a:rPr lang="ru-RU" sz="2400" b="1" dirty="0" smtClean="0">
+                <a:solidFill>
+                  <a:srgbClr val="023A84"/>
+                </a:solidFill>
+                <a:latin typeface="+mj-lt"/>
+                <a:ea typeface="Roboto" pitchFamily="2" charset="0"/>
+                <a:sym typeface="Calibri"/>
+              </a:rPr>
+              <a:t>, </a:t>
+            </a:r>
+            <a:r>
+              <a:rPr lang="ru-RU" sz="2400" b="1" dirty="0">
+                <a:solidFill>
+                  <a:srgbClr val="023A84"/>
+                </a:solidFill>
+                <a:latin typeface="+mj-lt"/>
+                <a:ea typeface="Roboto" pitchFamily="2" charset="0"/>
+                <a:sym typeface="Calibri"/>
+              </a:rPr>
+              <a:t>в которой реализованы следующие функции</a:t>
+            </a:r>
+            <a:r>
+              <a:rPr lang="ru-RU" sz="2400" b="1" dirty="0" smtClean="0">
+                <a:solidFill>
+                  <a:srgbClr val="023A84"/>
+                </a:solidFill>
+                <a:latin typeface="+mj-lt"/>
+                <a:ea typeface="Roboto" pitchFamily="2" charset="0"/>
+                <a:sym typeface="Calibri"/>
+              </a:rPr>
+              <a:t>:</a:t>
+            </a:r>
+          </a:p>
+          <a:p>
+            <a:pPr lvl="0"/>
+            <a:endParaRPr lang="ru-RU" sz="2400" b="1" dirty="0">
+              <a:solidFill>
+                <a:srgbClr val="023A84"/>
+              </a:solidFill>
+              <a:latin typeface="+mj-lt"/>
+              <a:ea typeface="Roboto" pitchFamily="2" charset="0"/>
+              <a:sym typeface="Calibri"/>
+            </a:endParaRPr>
+          </a:p>
+          <a:p>
+            <a:pPr lvl="0"/>
+            <a:r>
+              <a:rPr lang="ru-RU" sz="1600" b="1" i="1" dirty="0" err="1" smtClean="0">
+                <a:solidFill>
+                  <a:srgbClr val="023A84"/>
+                </a:solidFill>
+                <a:latin typeface="+mj-lt"/>
+                <a:ea typeface="Roboto" pitchFamily="2" charset="0"/>
+                <a:sym typeface="Calibri"/>
+              </a:rPr>
+              <a:t>print_match</a:t>
+            </a:r>
+            <a:r>
+              <a:rPr lang="ru-RU" sz="1600" b="1" i="1" dirty="0" smtClean="0">
+                <a:solidFill>
+                  <a:srgbClr val="023A84"/>
+                </a:solidFill>
+                <a:latin typeface="+mj-lt"/>
+                <a:ea typeface="Roboto" pitchFamily="2" charset="0"/>
+                <a:sym typeface="Calibri"/>
+              </a:rPr>
+              <a:t>() </a:t>
+            </a:r>
+            <a:r>
+              <a:rPr lang="ru-RU" sz="1600" b="1" dirty="0" smtClean="0">
+                <a:solidFill>
+                  <a:srgbClr val="023A84"/>
+                </a:solidFill>
+                <a:latin typeface="+mj-lt"/>
+                <a:ea typeface="Roboto" pitchFamily="2" charset="0"/>
+                <a:sym typeface="Calibri"/>
+              </a:rPr>
+              <a:t>- </a:t>
+            </a:r>
+            <a:r>
+              <a:rPr lang="ru-RU" sz="1600" b="1" dirty="0">
+                <a:solidFill>
+                  <a:srgbClr val="023A84"/>
+                </a:solidFill>
+                <a:latin typeface="+mj-lt"/>
+                <a:ea typeface="Roboto" pitchFamily="2" charset="0"/>
+                <a:sym typeface="Calibri"/>
+              </a:rPr>
+              <a:t>принимает паросочетание и выводит его в </a:t>
+            </a:r>
+            <a:r>
+              <a:rPr lang="ru-RU" sz="1600" b="1" dirty="0" smtClean="0">
+                <a:solidFill>
+                  <a:srgbClr val="023A84"/>
+                </a:solidFill>
+                <a:latin typeface="+mj-lt"/>
+                <a:ea typeface="Roboto" pitchFamily="2" charset="0"/>
+                <a:sym typeface="Calibri"/>
+              </a:rPr>
+              <a:t>консоль</a:t>
+            </a:r>
+            <a:r>
+              <a:rPr lang="ru-RU" sz="1600" b="1" i="1" dirty="0">
+                <a:solidFill>
+                  <a:srgbClr val="023A84"/>
+                </a:solidFill>
+                <a:latin typeface="+mj-lt"/>
+                <a:ea typeface="Roboto" pitchFamily="2" charset="0"/>
+                <a:sym typeface="Calibri"/>
+              </a:rPr>
+              <a:t/>
+            </a:r>
+            <a:br>
+              <a:rPr lang="ru-RU" sz="1600" b="1" i="1" dirty="0">
+                <a:solidFill>
+                  <a:srgbClr val="023A84"/>
+                </a:solidFill>
+                <a:latin typeface="+mj-lt"/>
+                <a:ea typeface="Roboto" pitchFamily="2" charset="0"/>
+                <a:sym typeface="Calibri"/>
+              </a:rPr>
+            </a:br>
+            <a:r>
+              <a:rPr lang="ru-RU" sz="1600" b="1" i="1" dirty="0">
+                <a:solidFill>
+                  <a:srgbClr val="023A84"/>
+                </a:solidFill>
+                <a:latin typeface="+mj-lt"/>
+                <a:ea typeface="Roboto" pitchFamily="2" charset="0"/>
+                <a:sym typeface="Calibri"/>
+              </a:rPr>
+              <a:t/>
+            </a:r>
+            <a:br>
+              <a:rPr lang="ru-RU" sz="1600" b="1" i="1" dirty="0">
+                <a:solidFill>
+                  <a:srgbClr val="023A84"/>
+                </a:solidFill>
+                <a:latin typeface="+mj-lt"/>
+                <a:ea typeface="Roboto" pitchFamily="2" charset="0"/>
+                <a:sym typeface="Calibri"/>
+              </a:rPr>
+            </a:br>
+            <a:r>
+              <a:rPr lang="ru-RU" sz="1600" b="1" i="1" dirty="0" err="1" smtClean="0">
+                <a:solidFill>
+                  <a:srgbClr val="023A84"/>
+                </a:solidFill>
+                <a:latin typeface="+mj-lt"/>
+                <a:ea typeface="Roboto" pitchFamily="2" charset="0"/>
+                <a:sym typeface="Calibri"/>
+              </a:rPr>
+              <a:t>get_match</a:t>
+            </a:r>
+            <a:r>
+              <a:rPr lang="ru-RU" sz="1600" b="1" i="1" dirty="0" smtClean="0">
+                <a:solidFill>
+                  <a:srgbClr val="023A84"/>
+                </a:solidFill>
+                <a:latin typeface="+mj-lt"/>
+                <a:ea typeface="Roboto" pitchFamily="2" charset="0"/>
+                <a:sym typeface="Calibri"/>
+              </a:rPr>
+              <a:t>()</a:t>
+            </a:r>
+            <a:r>
+              <a:rPr lang="ru-RU" sz="1600" b="1" dirty="0" smtClean="0">
+                <a:solidFill>
+                  <a:srgbClr val="023A84"/>
+                </a:solidFill>
+                <a:latin typeface="+mj-lt"/>
+                <a:ea typeface="Roboto" pitchFamily="2" charset="0"/>
+                <a:sym typeface="Calibri"/>
+              </a:rPr>
+              <a:t> - принимает </a:t>
+            </a:r>
+            <a:r>
+              <a:rPr lang="ru-RU" sz="1600" b="1" dirty="0">
+                <a:solidFill>
+                  <a:srgbClr val="023A84"/>
+                </a:solidFill>
+                <a:latin typeface="+mj-lt"/>
+                <a:ea typeface="Roboto" pitchFamily="2" charset="0"/>
+                <a:sym typeface="Calibri"/>
+              </a:rPr>
+              <a:t>список инцидентности и вектор, куда будет записано паросочетание. </a:t>
+            </a:r>
+            <a:r>
+              <a:rPr lang="ru-RU" sz="1600" b="1" dirty="0" smtClean="0">
+                <a:solidFill>
+                  <a:srgbClr val="023A84"/>
+                </a:solidFill>
+                <a:latin typeface="+mj-lt"/>
+                <a:ea typeface="Roboto" pitchFamily="2" charset="0"/>
+                <a:sym typeface="Calibri"/>
+              </a:rPr>
+              <a:t>Помещает </a:t>
+            </a:r>
+            <a:r>
+              <a:rPr lang="ru-RU" sz="1600" b="1" dirty="0">
+                <a:solidFill>
+                  <a:srgbClr val="023A84"/>
+                </a:solidFill>
+                <a:ea typeface="Roboto" pitchFamily="2" charset="0"/>
+                <a:sym typeface="Calibri"/>
+              </a:rPr>
+              <a:t>паросочетание </a:t>
+            </a:r>
+            <a:r>
+              <a:rPr lang="ru-RU" sz="1600" b="1" dirty="0" smtClean="0">
+                <a:solidFill>
+                  <a:srgbClr val="023A84"/>
+                </a:solidFill>
+                <a:latin typeface="+mj-lt"/>
+                <a:ea typeface="Roboto" pitchFamily="2" charset="0"/>
+                <a:sym typeface="Calibri"/>
+              </a:rPr>
+              <a:t>в </a:t>
+            </a:r>
+            <a:r>
+              <a:rPr lang="ru-RU" sz="1600" b="1" dirty="0">
+                <a:solidFill>
+                  <a:srgbClr val="023A84"/>
+                </a:solidFill>
+                <a:latin typeface="+mj-lt"/>
+                <a:ea typeface="Roboto" pitchFamily="2" charset="0"/>
+                <a:sym typeface="Calibri"/>
+              </a:rPr>
+              <a:t>переменную </a:t>
+            </a:r>
+            <a:r>
+              <a:rPr lang="ru-RU" sz="1600" b="1" i="1" dirty="0" smtClean="0">
+                <a:solidFill>
+                  <a:srgbClr val="023A84"/>
+                </a:solidFill>
+                <a:latin typeface="+mj-lt"/>
+                <a:ea typeface="Roboto" pitchFamily="2" charset="0"/>
+                <a:sym typeface="Calibri"/>
+              </a:rPr>
+              <a:t>a</a:t>
+            </a:r>
+            <a:r>
+              <a:rPr lang="ru-RU" sz="1600" b="1" dirty="0" smtClean="0">
+                <a:solidFill>
+                  <a:srgbClr val="023A84"/>
+                </a:solidFill>
+                <a:latin typeface="+mj-lt"/>
+                <a:ea typeface="Roboto" pitchFamily="2" charset="0"/>
+                <a:sym typeface="Calibri"/>
+              </a:rPr>
+              <a:t>. Включает в себя функции:</a:t>
+            </a:r>
+          </a:p>
+          <a:p>
+            <a:pPr lvl="0"/>
+            <a:endParaRPr lang="ru-RU" sz="1600" b="1" dirty="0">
+              <a:solidFill>
+                <a:srgbClr val="023A84"/>
+              </a:solidFill>
+              <a:latin typeface="+mj-lt"/>
+              <a:ea typeface="Roboto" pitchFamily="2" charset="0"/>
+              <a:sym typeface="Calibri"/>
+            </a:endParaRPr>
+          </a:p>
+          <a:p>
+            <a:pPr lvl="0"/>
+            <a:r>
+              <a:rPr lang="ru-RU" sz="1600" b="1" i="1" dirty="0" err="1" smtClean="0">
+                <a:solidFill>
+                  <a:srgbClr val="023A84"/>
+                </a:solidFill>
+                <a:latin typeface="+mj-lt"/>
+                <a:ea typeface="Roboto" pitchFamily="2" charset="0"/>
+                <a:sym typeface="Calibri"/>
+              </a:rPr>
+              <a:t>lca</a:t>
+            </a:r>
+            <a:r>
+              <a:rPr lang="ru-RU" sz="1600" b="1" i="1" dirty="0" smtClean="0">
+                <a:solidFill>
+                  <a:srgbClr val="023A84"/>
+                </a:solidFill>
+                <a:latin typeface="+mj-lt"/>
+                <a:ea typeface="Roboto" pitchFamily="2" charset="0"/>
+                <a:sym typeface="Calibri"/>
+              </a:rPr>
+              <a:t>() - </a:t>
+            </a:r>
+            <a:r>
+              <a:rPr lang="ru-RU" sz="1600" b="1" dirty="0">
+                <a:solidFill>
+                  <a:srgbClr val="023A84"/>
+                </a:solidFill>
+                <a:latin typeface="+mj-lt"/>
+                <a:ea typeface="Roboto" pitchFamily="2" charset="0"/>
+                <a:sym typeface="Calibri"/>
+              </a:rPr>
+              <a:t>находит общего ближайшего предка для вершин </a:t>
+            </a:r>
+            <a:r>
+              <a:rPr lang="ru-RU" sz="1600" b="1" dirty="0" smtClean="0">
+                <a:solidFill>
+                  <a:srgbClr val="023A84"/>
+                </a:solidFill>
+                <a:latin typeface="+mj-lt"/>
+                <a:ea typeface="Roboto" pitchFamily="2" charset="0"/>
+                <a:sym typeface="Calibri"/>
+              </a:rPr>
+              <a:t>цветка</a:t>
+            </a:r>
+          </a:p>
+          <a:p>
+            <a:pPr lvl="0"/>
+            <a:endParaRPr lang="ru-RU" sz="1600" b="1" dirty="0">
+              <a:solidFill>
+                <a:srgbClr val="023A84"/>
+              </a:solidFill>
+              <a:latin typeface="+mj-lt"/>
+              <a:ea typeface="Roboto" pitchFamily="2" charset="0"/>
+              <a:sym typeface="Calibri"/>
+            </a:endParaRPr>
+          </a:p>
+          <a:p>
+            <a:pPr lvl="0"/>
+            <a:r>
+              <a:rPr lang="ru-RU" sz="1600" b="1" i="1" dirty="0" err="1" smtClean="0">
+                <a:solidFill>
+                  <a:srgbClr val="023A84"/>
+                </a:solidFill>
+                <a:latin typeface="+mj-lt"/>
+                <a:ea typeface="Roboto" pitchFamily="2" charset="0"/>
+                <a:sym typeface="Calibri"/>
+              </a:rPr>
+              <a:t>mark</a:t>
+            </a:r>
+            <a:r>
+              <a:rPr lang="ru-RU" sz="1600" b="1" i="1" dirty="0">
+                <a:solidFill>
+                  <a:srgbClr val="023A84"/>
+                </a:solidFill>
+                <a:latin typeface="+mj-lt"/>
+                <a:ea typeface="Roboto" pitchFamily="2" charset="0"/>
+                <a:sym typeface="Calibri"/>
+              </a:rPr>
+              <a:t>\_</a:t>
+            </a:r>
+            <a:r>
+              <a:rPr lang="ru-RU" sz="1600" b="1" i="1" dirty="0" err="1">
+                <a:solidFill>
+                  <a:srgbClr val="023A84"/>
+                </a:solidFill>
+                <a:latin typeface="+mj-lt"/>
+                <a:ea typeface="Roboto" pitchFamily="2" charset="0"/>
+                <a:sym typeface="Calibri"/>
+              </a:rPr>
+              <a:t>path</a:t>
+            </a:r>
+            <a:r>
+              <a:rPr lang="ru-RU" sz="1600" b="1" i="1" dirty="0" smtClean="0">
+                <a:solidFill>
+                  <a:srgbClr val="023A84"/>
+                </a:solidFill>
+                <a:latin typeface="+mj-lt"/>
+                <a:ea typeface="Roboto" pitchFamily="2" charset="0"/>
+                <a:sym typeface="Calibri"/>
+              </a:rPr>
+              <a:t>() - </a:t>
+            </a:r>
+            <a:r>
+              <a:rPr lang="ru-RU" sz="1600" b="1" dirty="0" smtClean="0">
+                <a:solidFill>
+                  <a:srgbClr val="023A84"/>
+                </a:solidFill>
+                <a:latin typeface="+mj-lt"/>
+                <a:ea typeface="Roboto" pitchFamily="2" charset="0"/>
+                <a:sym typeface="Calibri"/>
+              </a:rPr>
+              <a:t>помечает </a:t>
+            </a:r>
+            <a:r>
+              <a:rPr lang="ru-RU" sz="1600" b="1" dirty="0">
+                <a:solidFill>
+                  <a:srgbClr val="023A84"/>
+                </a:solidFill>
+                <a:latin typeface="+mj-lt"/>
+                <a:ea typeface="Roboto" pitchFamily="2" charset="0"/>
+                <a:sym typeface="Calibri"/>
+              </a:rPr>
+              <a:t>чередующийся </a:t>
+            </a:r>
+            <a:r>
+              <a:rPr lang="ru-RU" sz="1600" b="1" dirty="0" smtClean="0">
+                <a:solidFill>
+                  <a:srgbClr val="023A84"/>
+                </a:solidFill>
+                <a:latin typeface="+mj-lt"/>
+                <a:ea typeface="Roboto" pitchFamily="2" charset="0"/>
+                <a:sym typeface="Calibri"/>
+              </a:rPr>
+              <a:t>путь</a:t>
+            </a:r>
+          </a:p>
+          <a:p>
+            <a:pPr lvl="0"/>
+            <a:endParaRPr lang="ru-RU" sz="1600" b="1" dirty="0">
+              <a:solidFill>
+                <a:srgbClr val="023A84"/>
+              </a:solidFill>
+              <a:latin typeface="+mj-lt"/>
+              <a:ea typeface="Roboto" pitchFamily="2" charset="0"/>
+              <a:sym typeface="Calibri"/>
+            </a:endParaRPr>
+          </a:p>
+          <a:p>
+            <a:pPr lvl="0"/>
+            <a:r>
+              <a:rPr lang="ru-RU" sz="1600" b="1" i="1" dirty="0" err="1" smtClean="0">
+                <a:solidFill>
+                  <a:srgbClr val="023A84"/>
+                </a:solidFill>
+                <a:latin typeface="+mj-lt"/>
+                <a:ea typeface="Roboto" pitchFamily="2" charset="0"/>
+                <a:sym typeface="Calibri"/>
+              </a:rPr>
+              <a:t>find_path</a:t>
+            </a:r>
+            <a:r>
+              <a:rPr lang="ru-RU" sz="1600" b="1" i="1" dirty="0" smtClean="0">
+                <a:solidFill>
+                  <a:srgbClr val="023A84"/>
+                </a:solidFill>
+                <a:latin typeface="+mj-lt"/>
+                <a:ea typeface="Roboto" pitchFamily="2" charset="0"/>
+                <a:sym typeface="Calibri"/>
+              </a:rPr>
+              <a:t>() - </a:t>
+            </a:r>
+            <a:r>
+              <a:rPr lang="ru-RU" sz="1600" b="1" dirty="0" smtClean="0">
+                <a:solidFill>
+                  <a:srgbClr val="023A84"/>
+                </a:solidFill>
+                <a:latin typeface="+mj-lt"/>
+                <a:ea typeface="Roboto" pitchFamily="2" charset="0"/>
+                <a:sym typeface="Calibri"/>
+              </a:rPr>
+              <a:t>ищет </a:t>
+            </a:r>
+            <a:r>
+              <a:rPr lang="ru-RU" sz="1600" b="1" dirty="0">
+                <a:solidFill>
+                  <a:srgbClr val="023A84"/>
+                </a:solidFill>
+                <a:latin typeface="+mj-lt"/>
+                <a:ea typeface="Roboto" pitchFamily="2" charset="0"/>
+                <a:sym typeface="Calibri"/>
+              </a:rPr>
+              <a:t>дополняющий путь из каждой вершины. </a:t>
+            </a:r>
+            <a:r>
+              <a:rPr lang="ru-RU" sz="1600" b="1" dirty="0" smtClean="0">
+                <a:solidFill>
+                  <a:srgbClr val="023A84"/>
+                </a:solidFill>
+                <a:latin typeface="+mj-lt"/>
+                <a:ea typeface="Roboto" pitchFamily="2" charset="0"/>
+                <a:sym typeface="Calibri"/>
+              </a:rPr>
+              <a:t>Результат </a:t>
+            </a:r>
+            <a:r>
+              <a:rPr lang="ru-RU" sz="1600" b="1" dirty="0">
+                <a:solidFill>
+                  <a:srgbClr val="023A84"/>
+                </a:solidFill>
+                <a:latin typeface="+mj-lt"/>
+                <a:ea typeface="Roboto" pitchFamily="2" charset="0"/>
+                <a:sym typeface="Calibri"/>
+              </a:rPr>
+              <a:t>работы </a:t>
+            </a:r>
+            <a:r>
+              <a:rPr lang="ru-RU" sz="1600" b="1" dirty="0" smtClean="0">
+                <a:solidFill>
+                  <a:srgbClr val="023A84"/>
+                </a:solidFill>
+                <a:latin typeface="+mj-lt"/>
+                <a:ea typeface="Roboto" pitchFamily="2" charset="0"/>
+                <a:sym typeface="Calibri"/>
+              </a:rPr>
+              <a:t>- последняя </a:t>
+            </a:r>
+            <a:r>
+              <a:rPr lang="ru-RU" sz="1600" b="1" dirty="0">
+                <a:solidFill>
+                  <a:srgbClr val="023A84"/>
+                </a:solidFill>
+                <a:latin typeface="+mj-lt"/>
+                <a:ea typeface="Roboto" pitchFamily="2" charset="0"/>
+                <a:sym typeface="Calibri"/>
+              </a:rPr>
+              <a:t>вершина дополняющего </a:t>
+            </a:r>
+            <a:r>
+              <a:rPr lang="ru-RU" sz="1600" b="1" dirty="0" smtClean="0">
+                <a:solidFill>
+                  <a:srgbClr val="023A84"/>
+                </a:solidFill>
+                <a:latin typeface="+mj-lt"/>
+                <a:ea typeface="Roboto" pitchFamily="2" charset="0"/>
+                <a:sym typeface="Calibri"/>
+              </a:rPr>
+              <a:t>пути</a:t>
+            </a:r>
+            <a:endParaRPr lang="ru-RU" sz="1600" b="1" dirty="0">
+              <a:solidFill>
+                <a:srgbClr val="023A84"/>
+              </a:solidFill>
+              <a:latin typeface="+mj-lt"/>
+              <a:ea typeface="Roboto" pitchFamily="2" charset="0"/>
+              <a:sym typeface="Calibri"/>
+            </a:endParaRPr>
+          </a:p>
+        </p:txBody>
+      </p:sp>
+    </p:spTree>
+    <p:extLst>
+      <p:ext uri="{BB962C8B-B14F-4D97-AF65-F5344CB8AC3E}">
+        <p14:creationId xmlns:p14="http://schemas.microsoft.com/office/powerpoint/2010/main" val="3768171636"/>
+      </p:ext>
+    </p:extLst>
+  </p:cSld>
+  <p:clrMapOvr>
+    <a:masterClrMapping/>
+  </p:clrMapOvr>
+  <p:timing>
+    <p:tnLst>
+      <p:par>
+        <p:cTn id="1" dur="indefinite" restart="never" nodeType="tmRoot"/>
+      </p:par>
+    </p:tnLst>
+  </p:timing>
+</p:sld>
+</file>
+
+<file path=ppt/slides/slide12.xml><?xml version="1.0" encoding="utf-8"?>
+<p:sld xmlns:a="http://schemas.openxmlformats.org/drawingml/2006/main" xmlns:r="http://schemas.openxmlformats.org/officeDocument/2006/relationships" xmlns:p="http://schemas.openxmlformats.org/presentationml/2006/main">
+  <p:cSld>
+    <p:spTree>
+      <p:nvGrpSpPr>
+        <p:cNvPr id="1" name=""/>
+        <p:cNvGrpSpPr/>
+        <p:nvPr/>
+      </p:nvGrpSpPr>
+      <p:grpSpPr>
+        <a:xfrm>
+          <a:off x="0" y="0"/>
+          <a:ext cx="0" cy="0"/>
+          <a:chOff x="0" y="0"/>
+          <a:chExt cx="0" cy="0"/>
+        </a:xfrm>
+      </p:grpSpPr>
+      <p:sp>
+        <p:nvSpPr>
+          <p:cNvPr id="3" name="Google Shape;154;gb6f6fa0e72_1_0"/>
+          <p:cNvSpPr/>
+          <p:nvPr/>
+        </p:nvSpPr>
+        <p:spPr>
+          <a:xfrm rot="5400000">
+            <a:off x="5387545" y="-5387546"/>
+            <a:ext cx="1416908" cy="12192001"/>
+          </a:xfrm>
+          <a:prstGeom prst="rect">
+            <a:avLst/>
+          </a:prstGeom>
+          <a:solidFill>
+            <a:srgbClr val="023A84"/>
+          </a:solidFill>
+          <a:ln>
+            <a:noFill/>
+          </a:ln>
+        </p:spPr>
+        <p:txBody>
+          <a:bodyPr spcFirstLastPara="1" wrap="square" lIns="91425" tIns="91425" rIns="91425" bIns="91425" anchor="ctr" anchorCtr="0">
+            <a:noAutofit/>
+          </a:bodyPr>
+          <a:lstStyle/>
+          <a:p>
+            <a:pPr marL="0" marR="0" lvl="0" indent="0" algn="ctr" rtl="0">
+              <a:lnSpc>
+                <a:spcPct val="100000"/>
+              </a:lnSpc>
+              <a:spcBef>
+                <a:spcPts val="0"/>
+              </a:spcBef>
+              <a:spcAft>
+                <a:spcPts val="0"/>
+              </a:spcAft>
+              <a:buClr>
+                <a:srgbClr val="000000"/>
+              </a:buClr>
+              <a:buSzPts val="1400"/>
+              <a:buFont typeface="Arial"/>
+              <a:buNone/>
+            </a:pPr>
+            <a:endParaRPr sz="1400" b="0" i="0" u="none" strike="noStrike" cap="none" dirty="0">
+              <a:solidFill>
+                <a:srgbClr val="000000"/>
+              </a:solidFill>
+              <a:latin typeface="+mj-lt"/>
+              <a:ea typeface="Arial"/>
+              <a:cs typeface="Arial"/>
+              <a:sym typeface="Arial"/>
+            </a:endParaRPr>
+          </a:p>
+        </p:txBody>
+      </p:sp>
+      <p:sp>
+        <p:nvSpPr>
+          <p:cNvPr id="16" name="Google Shape;116;p16">
+            <a:extLst>
+              <a:ext uri="{FF2B5EF4-FFF2-40B4-BE49-F238E27FC236}">
+                <a16:creationId xmlns:a16="http://schemas.microsoft.com/office/drawing/2014/main" id="{7AA952F0-A064-4726-955A-D3337EE6D9C4}"/>
+              </a:ext>
+            </a:extLst>
+          </p:cNvPr>
+          <p:cNvSpPr/>
+          <p:nvPr/>
+        </p:nvSpPr>
+        <p:spPr>
+          <a:xfrm>
+            <a:off x="526360" y="2663292"/>
+            <a:ext cx="1637403" cy="1536569"/>
+          </a:xfrm>
+          <a:prstGeom prst="ellipse">
+            <a:avLst/>
+          </a:prstGeom>
+          <a:solidFill>
+            <a:srgbClr val="BBD6EE">
+              <a:alpha val="49410"/>
+            </a:srgbClr>
+          </a:solidFill>
+          <a:ln>
+            <a:noFill/>
+          </a:ln>
+        </p:spPr>
+        <p:txBody>
+          <a:bodyPr spcFirstLastPara="1" wrap="square" lIns="91425" tIns="45700" rIns="91425" bIns="45700" anchor="ctr" anchorCtr="0">
+            <a:noAutofit/>
+          </a:bodyPr>
+          <a:lstStyle/>
+          <a:p>
+            <a:pPr marL="0" marR="0" lvl="0" indent="0" algn="ctr" rtl="0">
+              <a:lnSpc>
+                <a:spcPct val="100000"/>
+              </a:lnSpc>
+              <a:spcBef>
+                <a:spcPts val="0"/>
+              </a:spcBef>
+              <a:spcAft>
+                <a:spcPts val="0"/>
+              </a:spcAft>
+              <a:buClr>
+                <a:srgbClr val="000000"/>
+              </a:buClr>
+              <a:buSzPts val="1800"/>
+              <a:buFont typeface="Arial"/>
+              <a:buNone/>
+            </a:pPr>
+            <a:endParaRPr sz="2400" b="0" i="0" u="none" strike="noStrike" cap="none">
+              <a:solidFill>
+                <a:srgbClr val="FFFFFF"/>
+              </a:solidFill>
+              <a:latin typeface="Calibri"/>
+              <a:ea typeface="Calibri"/>
+              <a:cs typeface="Calibri"/>
+              <a:sym typeface="Calibri"/>
+            </a:endParaRPr>
+          </a:p>
+        </p:txBody>
+      </p:sp>
+      <p:sp>
+        <p:nvSpPr>
+          <p:cNvPr id="5" name="Прямоугольник 4">
+            <a:extLst>
+              <a:ext uri="{FF2B5EF4-FFF2-40B4-BE49-F238E27FC236}">
+                <a16:creationId xmlns:a16="http://schemas.microsoft.com/office/drawing/2014/main" id="{51EB4197-7888-4B6B-A423-9EFFA379FE9E}"/>
+              </a:ext>
+            </a:extLst>
+          </p:cNvPr>
+          <p:cNvSpPr/>
+          <p:nvPr/>
+        </p:nvSpPr>
+        <p:spPr>
+          <a:xfrm>
+            <a:off x="687602" y="292955"/>
+            <a:ext cx="8093932" cy="830997"/>
+          </a:xfrm>
+          <a:prstGeom prst="rect">
+            <a:avLst/>
+          </a:prstGeom>
+        </p:spPr>
+        <p:txBody>
+          <a:bodyPr wrap="square">
+            <a:spAutoFit/>
+          </a:bodyPr>
+          <a:lstStyle/>
+          <a:p>
+            <a:pPr lvl="0"/>
+            <a:r>
+              <a:rPr lang="ru-RU" sz="4800" b="1" dirty="0" smtClean="0">
+                <a:solidFill>
+                  <a:schemeClr val="bg1"/>
+                </a:solidFill>
+                <a:latin typeface="+mj-lt"/>
+                <a:ea typeface="Roboto" pitchFamily="2" charset="0"/>
+                <a:sym typeface="Calibri"/>
+              </a:rPr>
+              <a:t>Заключение</a:t>
+            </a:r>
+            <a:endParaRPr lang="ru-RU" sz="4800" b="1" dirty="0">
+              <a:solidFill>
+                <a:schemeClr val="bg1"/>
+              </a:solidFill>
+              <a:latin typeface="+mj-lt"/>
+              <a:ea typeface="Roboto" pitchFamily="2" charset="0"/>
+              <a:sym typeface="Calibri"/>
+            </a:endParaRPr>
+          </a:p>
+        </p:txBody>
+      </p:sp>
+      <p:sp>
+        <p:nvSpPr>
+          <p:cNvPr id="6" name="Прямоугольник 5">
+            <a:extLst>
+              <a:ext uri="{FF2B5EF4-FFF2-40B4-BE49-F238E27FC236}">
+                <a16:creationId xmlns:a16="http://schemas.microsoft.com/office/drawing/2014/main" id="{51EB4197-7888-4B6B-A423-9EFFA379FE9E}"/>
+              </a:ext>
+            </a:extLst>
+          </p:cNvPr>
+          <p:cNvSpPr/>
+          <p:nvPr/>
+        </p:nvSpPr>
+        <p:spPr>
+          <a:xfrm>
+            <a:off x="1165122" y="3085921"/>
+            <a:ext cx="10560032" cy="1569660"/>
+          </a:xfrm>
+          <a:prstGeom prst="rect">
+            <a:avLst/>
+          </a:prstGeom>
+        </p:spPr>
+        <p:txBody>
+          <a:bodyPr wrap="square">
+            <a:spAutoFit/>
+          </a:bodyPr>
+          <a:lstStyle/>
+          <a:p>
+            <a:pPr lvl="0"/>
+            <a:r>
+              <a:rPr lang="ru-RU" sz="2400" b="1" dirty="0" smtClean="0">
+                <a:solidFill>
+                  <a:srgbClr val="023A84"/>
+                </a:solidFill>
+                <a:latin typeface="+mj-lt"/>
+                <a:ea typeface="Roboto" pitchFamily="2" charset="0"/>
+                <a:sym typeface="Calibri"/>
+              </a:rPr>
+              <a:t>1. Появление алгоритма «Сжатие цветков» позволило решать новые задачи на графах с нечетными циклами</a:t>
+            </a:r>
+          </a:p>
+          <a:p>
+            <a:pPr lvl="0"/>
+            <a:r>
+              <a:rPr lang="ru-RU" sz="2400" b="1" dirty="0" smtClean="0">
+                <a:solidFill>
+                  <a:srgbClr val="023A84"/>
+                </a:solidFill>
+                <a:latin typeface="+mj-lt"/>
+                <a:ea typeface="Roboto" pitchFamily="2" charset="0"/>
+                <a:sym typeface="Calibri"/>
+              </a:rPr>
+              <a:t>2. Реализация библиотеки позволяет использовать алгоритм в других проектах</a:t>
+            </a:r>
+          </a:p>
+        </p:txBody>
+      </p:sp>
+      <p:grpSp>
+        <p:nvGrpSpPr>
+          <p:cNvPr id="11" name="Группа 10">
+            <a:extLst>
+              <a:ext uri="{FF2B5EF4-FFF2-40B4-BE49-F238E27FC236}">
+                <a16:creationId xmlns:a16="http://schemas.microsoft.com/office/drawing/2014/main" id="{17E153D2-2DB5-4A54-BE1B-C2C8933D26C9}"/>
+              </a:ext>
+            </a:extLst>
+          </p:cNvPr>
+          <p:cNvGrpSpPr/>
+          <p:nvPr/>
+        </p:nvGrpSpPr>
+        <p:grpSpPr>
+          <a:xfrm rot="16200000">
+            <a:off x="481198" y="3094569"/>
+            <a:ext cx="466151" cy="587340"/>
+            <a:chOff x="4107455" y="1921888"/>
+            <a:chExt cx="466151" cy="587340"/>
+          </a:xfrm>
+        </p:grpSpPr>
+        <p:sp>
+          <p:nvSpPr>
+            <p:cNvPr id="12" name="Google Shape;82;p15">
+              <a:extLst>
+                <a:ext uri="{FF2B5EF4-FFF2-40B4-BE49-F238E27FC236}">
+                  <a16:creationId xmlns:a16="http://schemas.microsoft.com/office/drawing/2014/main" id="{EB9885F6-7CCD-45EC-8D53-384083999F4D}"/>
+                </a:ext>
+              </a:extLst>
+            </p:cNvPr>
+            <p:cNvSpPr/>
+            <p:nvPr/>
+          </p:nvSpPr>
+          <p:spPr>
+            <a:xfrm rot="5407132">
+              <a:off x="4243012" y="1786331"/>
+              <a:ext cx="195038" cy="466151"/>
+            </a:xfrm>
+            <a:prstGeom prst="chevron">
+              <a:avLst>
+                <a:gd name="adj" fmla="val 50000"/>
+              </a:avLst>
+            </a:prstGeom>
+            <a:solidFill>
+              <a:srgbClr val="EFEFEF"/>
+            </a:solidFill>
+            <a:ln>
+              <a:noFill/>
+            </a:ln>
+          </p:spPr>
+          <p:txBody>
+            <a:bodyPr spcFirstLastPara="1" wrap="square" lIns="91425" tIns="91425" rIns="91425" bIns="91425" anchor="ctr" anchorCtr="0">
+              <a:noAutofit/>
+            </a:bodyPr>
+            <a:lstStyle/>
+            <a:p>
+              <a:pPr marL="0" marR="0" lvl="0" indent="0" algn="l" rtl="0">
+                <a:lnSpc>
+                  <a:spcPct val="100000"/>
+                </a:lnSpc>
+                <a:spcBef>
+                  <a:spcPts val="0"/>
+                </a:spcBef>
+                <a:spcAft>
+                  <a:spcPts val="0"/>
+                </a:spcAft>
+                <a:buClr>
+                  <a:srgbClr val="000000"/>
+                </a:buClr>
+                <a:buSzPts val="1400"/>
+                <a:buFont typeface="Arial"/>
+                <a:buNone/>
+              </a:pPr>
+              <a:endParaRPr sz="1600" b="0" i="0" u="none" strike="noStrike" cap="none">
+                <a:solidFill>
+                  <a:srgbClr val="000000"/>
+                </a:solidFill>
+                <a:ea typeface="Arial"/>
+                <a:cs typeface="Arial"/>
+                <a:sym typeface="Arial"/>
+              </a:endParaRPr>
+            </a:p>
+          </p:txBody>
+        </p:sp>
+        <p:sp>
+          <p:nvSpPr>
+            <p:cNvPr id="13" name="Google Shape;83;p15">
+              <a:extLst>
+                <a:ext uri="{FF2B5EF4-FFF2-40B4-BE49-F238E27FC236}">
+                  <a16:creationId xmlns:a16="http://schemas.microsoft.com/office/drawing/2014/main" id="{8B65E5A5-A9C3-45C0-B362-F80AEAE4DB45}"/>
+                </a:ext>
+              </a:extLst>
+            </p:cNvPr>
+            <p:cNvSpPr/>
+            <p:nvPr/>
+          </p:nvSpPr>
+          <p:spPr>
+            <a:xfrm rot="5407132">
+              <a:off x="4243012" y="1981369"/>
+              <a:ext cx="195038" cy="466151"/>
+            </a:xfrm>
+            <a:prstGeom prst="chevron">
+              <a:avLst>
+                <a:gd name="adj" fmla="val 50000"/>
+              </a:avLst>
+            </a:prstGeom>
+            <a:solidFill>
+              <a:srgbClr val="EFEFEF"/>
+            </a:solidFill>
+            <a:ln>
+              <a:noFill/>
+            </a:ln>
+          </p:spPr>
+          <p:txBody>
+            <a:bodyPr spcFirstLastPara="1" wrap="square" lIns="91425" tIns="91425" rIns="91425" bIns="91425" anchor="ctr" anchorCtr="0">
+              <a:noAutofit/>
+            </a:bodyPr>
+            <a:lstStyle/>
+            <a:p>
+              <a:pPr marL="0" marR="0" lvl="0" indent="0" algn="l" rtl="0">
+                <a:lnSpc>
+                  <a:spcPct val="100000"/>
+                </a:lnSpc>
+                <a:spcBef>
+                  <a:spcPts val="0"/>
+                </a:spcBef>
+                <a:spcAft>
+                  <a:spcPts val="0"/>
+                </a:spcAft>
+                <a:buClr>
+                  <a:srgbClr val="000000"/>
+                </a:buClr>
+                <a:buSzPts val="1400"/>
+                <a:buFont typeface="Arial"/>
+                <a:buNone/>
+              </a:pPr>
+              <a:endParaRPr sz="1600" b="0" i="0" u="none" strike="noStrike" cap="none">
+                <a:solidFill>
+                  <a:srgbClr val="000000"/>
+                </a:solidFill>
+                <a:ea typeface="Arial"/>
+                <a:cs typeface="Arial"/>
+                <a:sym typeface="Arial"/>
+              </a:endParaRPr>
+            </a:p>
+          </p:txBody>
+        </p:sp>
+        <p:sp>
+          <p:nvSpPr>
+            <p:cNvPr id="14" name="Google Shape;84;p15">
+              <a:extLst>
+                <a:ext uri="{FF2B5EF4-FFF2-40B4-BE49-F238E27FC236}">
+                  <a16:creationId xmlns:a16="http://schemas.microsoft.com/office/drawing/2014/main" id="{2F06A21B-F2BC-4FA9-B7AB-E5032D78D4ED}"/>
+                </a:ext>
+              </a:extLst>
+            </p:cNvPr>
+            <p:cNvSpPr/>
+            <p:nvPr/>
+          </p:nvSpPr>
+          <p:spPr>
+            <a:xfrm rot="5407132">
+              <a:off x="4243012" y="2178633"/>
+              <a:ext cx="195038" cy="466151"/>
+            </a:xfrm>
+            <a:prstGeom prst="chevron">
+              <a:avLst>
+                <a:gd name="adj" fmla="val 50000"/>
+              </a:avLst>
+            </a:prstGeom>
+            <a:solidFill>
+              <a:srgbClr val="EFEFEF"/>
+            </a:solidFill>
+            <a:ln>
+              <a:noFill/>
+            </a:ln>
+          </p:spPr>
+          <p:txBody>
+            <a:bodyPr spcFirstLastPara="1" wrap="square" lIns="91425" tIns="91425" rIns="91425" bIns="91425" anchor="ctr" anchorCtr="0">
+              <a:noAutofit/>
+            </a:bodyPr>
+            <a:lstStyle/>
+            <a:p>
+              <a:pPr marL="0" marR="0" lvl="0" indent="0" algn="l" rtl="0">
+                <a:lnSpc>
+                  <a:spcPct val="100000"/>
+                </a:lnSpc>
+                <a:spcBef>
+                  <a:spcPts val="0"/>
+                </a:spcBef>
+                <a:spcAft>
+                  <a:spcPts val="0"/>
+                </a:spcAft>
+                <a:buClr>
+                  <a:srgbClr val="000000"/>
+                </a:buClr>
+                <a:buSzPts val="1400"/>
+                <a:buFont typeface="Arial"/>
+                <a:buNone/>
+              </a:pPr>
+              <a:endParaRPr sz="1600" b="0" i="0" u="none" strike="noStrike" cap="none">
+                <a:solidFill>
+                  <a:srgbClr val="000000"/>
+                </a:solidFill>
+                <a:ea typeface="Arial"/>
+                <a:cs typeface="Arial"/>
+                <a:sym typeface="Arial"/>
+              </a:endParaRPr>
+            </a:p>
+          </p:txBody>
+        </p:sp>
+      </p:grpSp>
+      <p:sp>
+        <p:nvSpPr>
+          <p:cNvPr id="15" name="Google Shape;95;p15">
+            <a:extLst>
+              <a:ext uri="{FF2B5EF4-FFF2-40B4-BE49-F238E27FC236}">
+                <a16:creationId xmlns:a16="http://schemas.microsoft.com/office/drawing/2014/main" id="{66A93B06-885B-49FF-849C-EB422071ECE9}"/>
+              </a:ext>
+            </a:extLst>
+          </p:cNvPr>
+          <p:cNvSpPr/>
+          <p:nvPr/>
+        </p:nvSpPr>
+        <p:spPr>
+          <a:xfrm>
+            <a:off x="0" y="1338436"/>
+            <a:ext cx="11616920" cy="298223"/>
+          </a:xfrm>
+          <a:prstGeom prst="rightArrow">
+            <a:avLst>
+              <a:gd name="adj1" fmla="val 50000"/>
+              <a:gd name="adj2" fmla="val 50000"/>
+            </a:avLst>
+          </a:prstGeom>
+          <a:solidFill>
+            <a:schemeClr val="bg2">
+              <a:lumMod val="20000"/>
+              <a:lumOff val="80000"/>
+            </a:schemeClr>
+          </a:solidFill>
+          <a:ln>
+            <a:noFill/>
+          </a:ln>
+        </p:spPr>
+        <p:txBody>
+          <a:bodyPr spcFirstLastPara="1" wrap="square" lIns="91425" tIns="45700" rIns="91425" bIns="45700" anchor="ctr" anchorCtr="0">
+            <a:noAutofit/>
+          </a:bodyPr>
+          <a:lstStyle/>
+          <a:p>
+            <a:pPr marL="0" marR="0" lvl="0" indent="0" algn="ctr" rtl="0">
+              <a:lnSpc>
+                <a:spcPct val="100000"/>
+              </a:lnSpc>
+              <a:spcBef>
+                <a:spcPts val="0"/>
+              </a:spcBef>
+              <a:spcAft>
+                <a:spcPts val="0"/>
+              </a:spcAft>
+              <a:buNone/>
+            </a:pPr>
+            <a:endParaRPr sz="1600" b="0" i="0" u="none" strike="noStrike" cap="none">
+              <a:solidFill>
+                <a:schemeClr val="lt1"/>
+              </a:solidFill>
+              <a:latin typeface="+mj-lt"/>
+              <a:ea typeface="Arial"/>
+              <a:cs typeface="Arial"/>
+              <a:sym typeface="Arial"/>
+            </a:endParaRPr>
+          </a:p>
+        </p:txBody>
+      </p:sp>
+      <p:sp>
+        <p:nvSpPr>
+          <p:cNvPr id="17" name="Прямоугольник 16">
+            <a:extLst>
+              <a:ext uri="{FF2B5EF4-FFF2-40B4-BE49-F238E27FC236}">
+                <a16:creationId xmlns:a16="http://schemas.microsoft.com/office/drawing/2014/main" id="{51EB4197-7888-4B6B-A423-9EFFA379FE9E}"/>
+              </a:ext>
+            </a:extLst>
+          </p:cNvPr>
+          <p:cNvSpPr/>
+          <p:nvPr/>
+        </p:nvSpPr>
+        <p:spPr>
+          <a:xfrm>
+            <a:off x="180975" y="6366139"/>
+            <a:ext cx="338009" cy="338554"/>
+          </a:xfrm>
+          <a:prstGeom prst="rect">
+            <a:avLst/>
+          </a:prstGeom>
+        </p:spPr>
+        <p:txBody>
+          <a:bodyPr wrap="square">
+            <a:spAutoFit/>
+          </a:bodyPr>
+          <a:lstStyle/>
+          <a:p>
+            <a:pPr lvl="0"/>
+            <a:r>
+              <a:rPr lang="ru-RU" sz="1600" b="1" dirty="0" smtClean="0">
+                <a:solidFill>
+                  <a:srgbClr val="023A84"/>
+                </a:solidFill>
+                <a:latin typeface="+mj-lt"/>
+                <a:ea typeface="Roboto" pitchFamily="2" charset="0"/>
+                <a:sym typeface="Calibri"/>
+              </a:rPr>
+              <a:t>4</a:t>
+            </a:r>
+          </a:p>
+        </p:txBody>
+      </p:sp>
+    </p:spTree>
+    <p:extLst>
+      <p:ext uri="{BB962C8B-B14F-4D97-AF65-F5344CB8AC3E}">
+        <p14:creationId xmlns:p14="http://schemas.microsoft.com/office/powerpoint/2010/main" val="1250613718"/>
+      </p:ext>
+    </p:extLst>
+  </p:cSld>
+  <p:clrMapOvr>
+    <a:masterClrMapping/>
+  </p:clrMapOvr>
+  <p:timing>
+    <p:tnLst>
+      <p:par>
+        <p:cTn id="1" dur="indefinite" restart="never" nodeType="tmRoot"/>
+      </p:par>
+    </p:tnLst>
+  </p:timing>
 </p:sld>
 </file>
 
@@ -23804,7 +25090,7 @@
         <p:spPr>
           <a:xfrm>
             <a:off x="687602" y="2630279"/>
-            <a:ext cx="6383758" cy="2554545"/>
+            <a:ext cx="6383758" cy="1569660"/>
           </a:xfrm>
           <a:prstGeom prst="rect">
             <a:avLst/>
@@ -23901,7 +25187,7 @@
                 <a:ea typeface="Roboto" pitchFamily="2" charset="0"/>
                 <a:sym typeface="Calibri"/>
               </a:rPr>
-              <a:t>Основной </a:t>
+              <a:t>Основная причина важности алгоритма – первое доказательство </a:t>
             </a:r>
             <a:r>
               <a:rPr lang="ru-RU" sz="1600" b="1" dirty="0">
@@ -23912,7 +25198,7 @@
                 <a:ea typeface="Roboto" pitchFamily="2" charset="0"/>
                 <a:sym typeface="Calibri"/>
               </a:rPr>
-              <a:t>причиной, почему алгоритм сжатия цветков важен, является то, что он дал первое доказательство возможности нахождения наибольшего </a:t>
+              <a:t>возможности нахождения наибольшего </a:t>
             </a:r>
             <a:r>
               <a:rPr lang="ru-RU" sz="1600" b="1" dirty="0" err="1">
@@ -23934,51 +25220,7 @@
                 <a:ea typeface="Roboto" pitchFamily="2" charset="0"/>
                 <a:sym typeface="Calibri"/>
               </a:rPr>
-              <a:t> за полиномиальное время. Другой причиной является то, что метод приводит к описанию многогранника линейного программирования для многогранника </a:t>
-            </a:r>
-            <a:r>
-              <a:rPr lang="ru-RU" sz="1600" b="1" dirty="0" err="1">
-                <a:solidFill>
-                  <a:srgbClr val="023A84"/>
-                </a:solidFill>
-                <a:latin typeface="+mj-lt"/>
-                <a:ea typeface="Roboto" pitchFamily="2" charset="0"/>
-                <a:sym typeface="Calibri"/>
-              </a:rPr>
-              <a:t>паросочетаний</a:t>
-            </a:r>
-            <a:r>
-              <a:rPr lang="ru-RU" sz="1600" b="1" dirty="0">
-                <a:solidFill>
-                  <a:srgbClr val="023A84"/>
-                </a:solidFill>
-                <a:latin typeface="+mj-lt"/>
-                <a:ea typeface="Roboto" pitchFamily="2" charset="0"/>
-                <a:sym typeface="Calibri"/>
-              </a:rPr>
-              <a:t>, что приводит к алгоритму </a:t>
-            </a:r>
-            <a:r>
-              <a:rPr lang="ru-RU" sz="1600" b="1" dirty="0" err="1">
-                <a:solidFill>
-                  <a:srgbClr val="023A84"/>
-                </a:solidFill>
-                <a:latin typeface="+mj-lt"/>
-                <a:ea typeface="Roboto" pitchFamily="2" charset="0"/>
-                <a:sym typeface="Calibri"/>
-              </a:rPr>
-              <a:t>паросочетания</a:t>
-            </a:r>
-            <a:r>
-              <a:rPr lang="ru-RU" sz="1600" b="1" dirty="0">
-                <a:solidFill>
-                  <a:srgbClr val="023A84"/>
-                </a:solidFill>
-                <a:latin typeface="+mj-lt"/>
-                <a:ea typeface="Roboto" pitchFamily="2" charset="0"/>
-                <a:sym typeface="Calibri"/>
-              </a:rPr>
-              <a:t> минимального веса.</a:t>
+              <a:t> за полиномиальное время. </a:t>
             </a:r>
           </a:p>
         </p:txBody>
@@ -24047,6 +25289,48 @@
           </a:extLst>
         </p:spPr>
       </p:pic>
+      <p:sp>
+        <p:nvSpPr>
+          <p:cNvPr id="8" name="Прямоугольник 7">
+            <a:extLst>
+              <a:ext uri="{FF2B5EF4-FFF2-40B4-BE49-F238E27FC236}">
+                <a16:creationId xmlns:a16="http://schemas.microsoft.com/office/drawing/2014/main" id="{51EB4197-7888-4B6B-A423-9EFFA379FE9E}"/>
+              </a:ext>
+            </a:extLst>
+          </p:cNvPr>
+          <p:cNvSpPr/>
+          <p:nvPr/>
+        </p:nvSpPr>
+        <p:spPr>
+          <a:xfrm>
+            <a:off x="180975" y="6366139"/>
+            <a:ext cx="338009" cy="338554"/>
+          </a:xfrm>
+          <a:prstGeom prst="rect">
+            <a:avLst/>
+          </a:prstGeom>
+        </p:spPr>
+        <p:txBody>
+          <a:bodyPr wrap="square">
+            <a:spAutoFit/>
+          </a:bodyPr>
+          <a:lstStyle/>
+          <a:p>
+            <a:pPr lvl="0"/>
+            <a:r>
+              <a:rPr lang="ru-RU" sz="1600" b="1" dirty="0" smtClean="0">
+                <a:solidFill>
+                  <a:srgbClr val="023A84"/>
+                </a:solidFill>
+                <a:latin typeface="+mj-lt"/>
+                <a:ea typeface="Roboto" pitchFamily="2" charset="0"/>
+                <a:sym typeface="Calibri"/>
+              </a:rPr>
+              <a:t>2</a:t>
+            </a:r>
+          </a:p>
+        </p:txBody>
+      </p:sp>
     </p:spTree>
     <p:extLst>
       <p:ext uri="{BB962C8B-B14F-4D97-AF65-F5344CB8AC3E}">
@@ -24057,6 +25341,13 @@
   <p:clrMapOvr>
     <a:masterClrMapping/>
   </p:clrMapOvr>
+  <p:timing>
+    <p:tnLst>
+      <p:par>
+        <p:cTn id="1" dur="indefinite" restart="never" nodeType="tmRoot"/>
+      </p:par>
+    </p:tnLst>
+  </p:timing>
 </p:sld>
 </file>
 
@@ -24378,6 +25669,56 @@
           </a:ln>
         </p:spPr>
       </p:cxnSp>
+      <p:sp>
+        <p:nvSpPr>
+          <p:cNvPr id="10" name="Прямоугольник 9">
+            <a:extLst>
+              <a:ext uri="{FF2B5EF4-FFF2-40B4-BE49-F238E27FC236}">
+                <a16:creationId xmlns:a16="http://schemas.microsoft.com/office/drawing/2014/main" id="{51EB4197-7888-4B6B-A423-9EFFA379FE9E}"/>
+              </a:ext>
+            </a:extLst>
+          </p:cNvPr>
+          <p:cNvSpPr/>
+          <p:nvPr/>
+        </p:nvSpPr>
+        <p:spPr>
+          <a:xfrm>
+            <a:off x="180975" y="6366139"/>
+            <a:ext cx="338009" cy="338554"/>
+          </a:xfrm>
+          <a:prstGeom prst="rect">
+            <a:avLst/>
+          </a:prstGeom>
+        </p:spPr>
+        <p:txBody>
+          <a:bodyPr wrap="square">
+            <a:spAutoFit/>
+          </a:bodyPr>
+          <a:lstStyle/>
+          <a:p>
+            <a:pPr lvl="0"/>
+            <a:r>
+              <a:rPr lang="ru-RU" sz="1600" b="1" dirty="0">
+                <a:solidFill>
+                  <a:srgbClr val="023A84"/>
+                </a:solidFill>
+                <a:latin typeface="+mj-lt"/>
+                <a:ea typeface="Roboto" pitchFamily="2" charset="0"/>
+                <a:sym typeface="Calibri"/>
+              </a:rPr>
+              <a:t>3</a:t>
+            </a:r>
+            <a:endParaRPr lang="ru-RU" sz="1600" b="1" dirty="0" smtClean="0">
+              <a:solidFill>
+                <a:srgbClr val="023A84"/>
+              </a:solidFill>
+              <a:latin typeface="+mj-lt"/>
+              <a:ea typeface="Roboto" pitchFamily="2" charset="0"/>
+              <a:sym typeface="Calibri"/>
+            </a:endParaRPr>
+          </a:p>
+        </p:txBody>
+      </p:sp>
     </p:spTree>
     <p:extLst>
       <p:ext uri="{BB962C8B-B14F-4D97-AF65-F5344CB8AC3E}">
@@ -24388,6 +25729,13 @@
   <p:clrMapOvr>
     <a:masterClrMapping/>
   </p:clrMapOvr>
+  <p:timing>
+    <p:tnLst>
+      <p:par>
+        <p:cTn id="1" dur="indefinite" restart="never" nodeType="tmRoot"/>
+      </p:par>
+    </p:tnLst>
+  </p:timing>
 </p:sld>
 </file>
 
@@ -24466,6 +25814,70 @@
       </p:sp>
       <p:sp>
         <p:nvSpPr>
+          <p:cNvPr id="16" name="Google Shape;116;p16">
+            <a:extLst>
+              <a:ext uri="{FF2B5EF4-FFF2-40B4-BE49-F238E27FC236}">
+                <a16:creationId xmlns:a16="http://schemas.microsoft.com/office/drawing/2014/main" id="{7AA952F0-A064-4726-955A-D3337EE6D9C4}"/>
+              </a:ext>
+            </a:extLst>
+          </p:cNvPr>
+          <p:cNvSpPr/>
+          <p:nvPr/>
+        </p:nvSpPr>
+        <p:spPr>
+          <a:xfrm>
+            <a:off x="526360" y="2935141"/>
+            <a:ext cx="1637403" cy="1536569"/>
+          </a:xfrm>
+          <a:prstGeom prst="ellipse">
+            <a:avLst/>
+          </a:prstGeom>
+          <a:solidFill>
+            <a:srgbClr val="BBD6EE">
+              <a:alpha val="49410"/>
+            </a:srgbClr>
+          </a:solidFill>
+          <a:ln>
+            <a:noFill/>
+          </a:ln>
+        </p:spPr>
+        <p:txBody>
+          <a:bodyPr spcFirstLastPara="1" wrap="square" lIns="91425" tIns="45700" rIns="91425" bIns="45700" anchor="ctr" anchorCtr="0">
+            <a:noAutofit/>
+          </a:bodyPr>
+          <a:lstStyle/>
+          <a:p>
+            <a:pPr marL="0" marR="0" lvl="0" indent="0" algn="ctr" rtl="0">
+              <a:lnSpc>
+                <a:spcPct val="100000"/>
+              </a:lnSpc>
+              <a:spcBef>
+                <a:spcPts val="0"/>
+              </a:spcBef>
+              <a:spcAft>
+                <a:spcPts val="0"/>
+              </a:spcAft>
+              <a:buClr>
+                <a:srgbClr val="000000"/>
+              </a:buClr>
+              <a:buSzPts val="1800"/>
+              <a:buFont typeface="Arial"/>
+              <a:buNone/>
+            </a:pPr>
+            <a:endParaRPr sz="2400" b="0" i="0" u="none" strike="noStrike" cap="none">
+              <a:solidFill>
+                <a:srgbClr val="FFFFFF"/>
+              </a:solidFill>
+              <a:latin typeface="Calibri"/>
+              <a:ea typeface="Calibri"/>
+              <a:cs typeface="Calibri"/>
+              <a:sym typeface="Calibri"/>
+            </a:endParaRPr>
+          </a:p>
+        </p:txBody>
+      </p:sp>
+      <p:sp>
+        <p:nvSpPr>
           <p:cNvPr id="5" name="Прямоугольник 4">
             <a:extLst>
               <a:ext uri="{FF2B5EF4-FFF2-40B4-BE49-F238E27FC236}">
@@ -24529,7 +25941,7 @@
         <p:spPr>
           <a:xfrm>
             <a:off x="1165122" y="3357770"/>
-            <a:ext cx="10560032" cy="1200329"/>
+            <a:ext cx="10560032" cy="830997"/>
           </a:xfrm>
           <a:prstGeom prst="rect">
             <a:avLst/>
@@ -24606,7 +26018,29 @@
                 <a:ea typeface="Roboto" pitchFamily="2" charset="0"/>
                 <a:sym typeface="Calibri"/>
               </a:rPr>
-              <a:t>) — это алгоритм в теории графов для построения наибольших </a:t>
+              <a:t>) — это </a:t>
+            </a:r>
+            <a:r>
+              <a:rPr lang="ru-RU" sz="2400" b="1" dirty="0" smtClean="0">
+                <a:solidFill>
+                  <a:srgbClr val="023A84"/>
+                </a:solidFill>
+                <a:latin typeface="+mj-lt"/>
+                <a:ea typeface="Roboto" pitchFamily="2" charset="0"/>
+                <a:sym typeface="Calibri"/>
+              </a:rPr>
+              <a:t>алгоритм для </a:t>
+            </a:r>
+            <a:r>
+              <a:rPr lang="ru-RU" sz="2400" b="1" dirty="0">
+                <a:solidFill>
+                  <a:srgbClr val="023A84"/>
+                </a:solidFill>
+                <a:latin typeface="+mj-lt"/>
+                <a:ea typeface="Roboto" pitchFamily="2" charset="0"/>
+                <a:sym typeface="Calibri"/>
+              </a:rPr>
+              <a:t>построения наибольших </a:t>
             </a:r>
             <a:r>
               <a:rPr lang="ru-RU" sz="2400" b="1" dirty="0" err="1">
@@ -24956,6 +26390,48 @@
           </a:p>
         </p:txBody>
       </p:sp>
+      <p:sp>
+        <p:nvSpPr>
+          <p:cNvPr id="17" name="Прямоугольник 16">
+            <a:extLst>
+              <a:ext uri="{FF2B5EF4-FFF2-40B4-BE49-F238E27FC236}">
+                <a16:creationId xmlns:a16="http://schemas.microsoft.com/office/drawing/2014/main" id="{51EB4197-7888-4B6B-A423-9EFFA379FE9E}"/>
+              </a:ext>
+            </a:extLst>
+          </p:cNvPr>
+          <p:cNvSpPr/>
+          <p:nvPr/>
+        </p:nvSpPr>
+        <p:spPr>
+          <a:xfrm>
+            <a:off x="180975" y="6366139"/>
+            <a:ext cx="338009" cy="338554"/>
+          </a:xfrm>
+          <a:prstGeom prst="rect">
+            <a:avLst/>
+          </a:prstGeom>
+        </p:spPr>
+        <p:txBody>
+          <a:bodyPr wrap="square">
+            <a:spAutoFit/>
+          </a:bodyPr>
+          <a:lstStyle/>
+          <a:p>
+            <a:pPr lvl="0"/>
+            <a:r>
+              <a:rPr lang="ru-RU" sz="1600" b="1" dirty="0" smtClean="0">
+                <a:solidFill>
+                  <a:srgbClr val="023A84"/>
+                </a:solidFill>
+                <a:latin typeface="+mj-lt"/>
+                <a:ea typeface="Roboto" pitchFamily="2" charset="0"/>
+                <a:sym typeface="Calibri"/>
+              </a:rPr>
+              <a:t>4</a:t>
+            </a:r>
+          </a:p>
+        </p:txBody>
+      </p:sp>
     </p:spTree>
     <p:extLst>
       <p:ext uri="{BB962C8B-B14F-4D97-AF65-F5344CB8AC3E}">
@@ -24966,6 +26442,13 @@
   <p:clrMapOvr>
     <a:masterClrMapping/>
   </p:clrMapOvr>
+  <p:timing>
+    <p:tnLst>
+      <p:par>
+        <p:cTn id="1" dur="indefinite" restart="never" nodeType="tmRoot"/>
+      </p:par>
+    </p:tnLst>
+  </p:timing>
 </p:sld>
 </file>
 
@@ -25107,7 +26590,7 @@
         <p:spPr>
           <a:xfrm>
             <a:off x="1056888" y="2975095"/>
-            <a:ext cx="10560032" cy="2308324"/>
+            <a:ext cx="8960323" cy="2677656"/>
           </a:xfrm>
           <a:prstGeom prst="rect">
             <a:avLst/>
@@ -25140,7 +26623,7 @@
                 <a:ea typeface="Roboto" pitchFamily="2" charset="0"/>
                 <a:sym typeface="Calibri"/>
               </a:rPr>
-              <a:t>n </a:t>
+              <a:t>n итерации, на </a:t>
             </a:r>
             <a:r>
               <a:rPr lang="ru-RU" sz="2400" b="1" dirty="0">
@@ -25151,7 +26634,7 @@
                 <a:ea typeface="Roboto" pitchFamily="2" charset="0"/>
                 <a:sym typeface="Calibri"/>
               </a:rPr>
-              <a:t>итераций, на каждой из которых выполняется обход в ширину за </a:t>
+              <a:t>каждой </a:t>
             </a:r>
             <a:r>
               <a:rPr lang="ru-RU" sz="2400" b="1" dirty="0" smtClean="0">
@@ -25162,7 +26645,7 @@
                 <a:ea typeface="Roboto" pitchFamily="2" charset="0"/>
                 <a:sym typeface="Calibri"/>
               </a:rPr>
-              <a:t>O(m) </a:t>
+              <a:t>выполняется </a:t>
             </a:r>
             <a:r>
               <a:rPr lang="ru-RU" sz="2400" b="1" dirty="0">
@@ -25173,7 +26656,7 @@
                 <a:ea typeface="Roboto" pitchFamily="2" charset="0"/>
                 <a:sym typeface="Calibri"/>
               </a:rPr>
-              <a:t>кроме того, могут происходить операции сжатия цветков — их может быть </a:t>
+              <a:t>обход в ширину </a:t>
             </a:r>
             <a:r>
               <a:rPr lang="ru-RU" sz="2400" b="1" dirty="0" smtClean="0">
@@ -25184,7 +26667,158 @@
                 <a:ea typeface="Roboto" pitchFamily="2" charset="0"/>
                 <a:sym typeface="Calibri"/>
               </a:rPr>
-              <a:t>O(n).</a:t>
+              <a:t>O(m).</a:t>
+            </a:r>
+            <a:br>
+              <a:rPr lang="ru-RU" sz="2400" b="1" dirty="0" smtClean="0">
+                <a:solidFill>
+                  <a:srgbClr val="023A84"/>
+                </a:solidFill>
+                <a:latin typeface="+mj-lt"/>
+                <a:ea typeface="Roboto" pitchFamily="2" charset="0"/>
+                <a:sym typeface="Calibri"/>
+              </a:rPr>
+            </a:br>
+            <a:r>
+              <a:rPr lang="ru-RU" sz="2400" b="1" dirty="0" smtClean="0">
+                <a:solidFill>
+                  <a:srgbClr val="023A84"/>
+                </a:solidFill>
+                <a:latin typeface="+mj-lt"/>
+                <a:ea typeface="Roboto" pitchFamily="2" charset="0"/>
+                <a:sym typeface="Calibri"/>
+              </a:rPr>
+              <a:t>Операции сжатия </a:t>
+            </a:r>
+            <a:r>
+              <a:rPr lang="ru-RU" sz="2400" b="1" dirty="0">
+                <a:solidFill>
+                  <a:srgbClr val="023A84"/>
+                </a:solidFill>
+                <a:latin typeface="+mj-lt"/>
+                <a:ea typeface="Roboto" pitchFamily="2" charset="0"/>
+                <a:sym typeface="Calibri"/>
+              </a:rPr>
+              <a:t>цветков </a:t>
+            </a:r>
+            <a:r>
+              <a:rPr lang="ru-RU" sz="2400" b="1" dirty="0" smtClean="0">
+                <a:solidFill>
+                  <a:srgbClr val="023A84"/>
+                </a:solidFill>
+                <a:latin typeface="+mj-lt"/>
+                <a:ea typeface="Roboto" pitchFamily="2" charset="0"/>
+                <a:sym typeface="Calibri"/>
+              </a:rPr>
+              <a:t>может </a:t>
+            </a:r>
+            <a:r>
+              <a:rPr lang="ru-RU" sz="2400" b="1" dirty="0">
+                <a:solidFill>
+                  <a:srgbClr val="023A84"/>
+                </a:solidFill>
+                <a:latin typeface="+mj-lt"/>
+                <a:ea typeface="Roboto" pitchFamily="2" charset="0"/>
+                <a:sym typeface="Calibri"/>
+              </a:rPr>
+              <a:t>быть </a:t>
+            </a:r>
+            <a:r>
+              <a:rPr lang="ru-RU" sz="2400" b="1" dirty="0" smtClean="0">
+                <a:solidFill>
+                  <a:srgbClr val="023A84"/>
+                </a:solidFill>
+                <a:latin typeface="+mj-lt"/>
+                <a:ea typeface="Roboto" pitchFamily="2" charset="0"/>
+                <a:sym typeface="Calibri"/>
+              </a:rPr>
+              <a:t>O(n_1).</a:t>
+            </a:r>
+            <a:br>
+              <a:rPr lang="ru-RU" sz="2400" b="1" dirty="0" smtClean="0">
+                <a:solidFill>
+                  <a:srgbClr val="023A84"/>
+                </a:solidFill>
+                <a:latin typeface="+mj-lt"/>
+                <a:ea typeface="Roboto" pitchFamily="2" charset="0"/>
+                <a:sym typeface="Calibri"/>
+              </a:rPr>
+            </a:br>
+            <a:r>
+              <a:rPr lang="ru-RU" sz="2400" b="1" dirty="0" smtClean="0">
+                <a:solidFill>
+                  <a:srgbClr val="023A84"/>
+                </a:solidFill>
+                <a:latin typeface="+mj-lt"/>
+                <a:ea typeface="Roboto" pitchFamily="2" charset="0"/>
+                <a:sym typeface="Calibri"/>
+              </a:rPr>
+              <a:t>Сжатие </a:t>
+            </a:r>
+            <a:r>
+              <a:rPr lang="ru-RU" sz="2400" b="1" dirty="0">
+                <a:solidFill>
+                  <a:srgbClr val="023A84"/>
+                </a:solidFill>
+                <a:latin typeface="+mj-lt"/>
+                <a:ea typeface="Roboto" pitchFamily="2" charset="0"/>
+                <a:sym typeface="Calibri"/>
+              </a:rPr>
+              <a:t>соцветий работает за </a:t>
+            </a:r>
+            <a:r>
+              <a:rPr lang="ru-RU" sz="2400" b="1" dirty="0" smtClean="0">
+                <a:solidFill>
+                  <a:srgbClr val="023A84"/>
+                </a:solidFill>
+                <a:latin typeface="+mj-lt"/>
+                <a:ea typeface="Roboto" pitchFamily="2" charset="0"/>
+                <a:sym typeface="Calibri"/>
+              </a:rPr>
+              <a:t>O(n_2)с</a:t>
+            </a:r>
+            <a:br>
+              <a:rPr lang="ru-RU" sz="2400" b="1" dirty="0" smtClean="0">
+                <a:solidFill>
+                  <a:srgbClr val="023A84"/>
+                </a:solidFill>
+                <a:latin typeface="+mj-lt"/>
+                <a:ea typeface="Roboto" pitchFamily="2" charset="0"/>
+                <a:sym typeface="Calibri"/>
+              </a:rPr>
+            </a:br>
+            <a:r>
+              <a:rPr lang="ru-RU" sz="2400" b="1" dirty="0" smtClean="0">
+                <a:solidFill>
+                  <a:srgbClr val="023A84"/>
+                </a:solidFill>
+                <a:latin typeface="+mj-lt"/>
+                <a:ea typeface="Roboto" pitchFamily="2" charset="0"/>
+                <a:sym typeface="Calibri"/>
+              </a:rPr>
+              <a:t>Стоит </a:t>
+            </a:r>
+            <a:r>
+              <a:rPr lang="ru-RU" sz="2400" b="1" dirty="0">
+                <a:solidFill>
+                  <a:srgbClr val="023A84"/>
+                </a:solidFill>
+                <a:latin typeface="+mj-lt"/>
+                <a:ea typeface="Roboto" pitchFamily="2" charset="0"/>
+                <a:sym typeface="Calibri"/>
+              </a:rPr>
+              <a:t>отметить </a:t>
+            </a:r>
+            <a:r>
+              <a:rPr lang="ru-RU" sz="2400" b="1" dirty="0" smtClean="0">
+                <a:solidFill>
+                  <a:srgbClr val="023A84"/>
+                </a:solidFill>
+                <a:latin typeface="+mj-lt"/>
+                <a:ea typeface="Roboto" pitchFamily="2" charset="0"/>
+                <a:sym typeface="Calibri"/>
+              </a:rPr>
+              <a:t>- n_1 = n_2</a:t>
             </a:r>
             <a:br>
               <a:rPr lang="ru-RU" sz="2400" b="1" dirty="0" smtClean="0">
@@ -25226,7 +26860,7 @@
                 <a:ea typeface="Roboto" pitchFamily="2" charset="0"/>
                 <a:sym typeface="Calibri"/>
               </a:rPr>
-              <a:t>Сжатие </a:t>
+              <a:t>Общая </a:t>
             </a:r>
             <a:r>
               <a:rPr lang="ru-RU" sz="2400" b="1" dirty="0">
@@ -25237,7 +26871,7 @@
                 <a:ea typeface="Roboto" pitchFamily="2" charset="0"/>
                 <a:sym typeface="Calibri"/>
               </a:rPr>
-              <a:t>соцветий работает за </a:t>
+              <a:t>асимптотика алгоритма </a:t>
             </a:r>
             <a:r>
               <a:rPr lang="ru-RU" sz="2400" b="1" dirty="0" smtClean="0">
@@ -25248,7 +26882,7 @@
                 <a:ea typeface="Roboto" pitchFamily="2" charset="0"/>
                 <a:sym typeface="Calibri"/>
               </a:rPr>
-              <a:t>O(n), </a:t>
+              <a:t>- O(n(m+n^2</a:t>
             </a:r>
             <a:r>
               <a:rPr lang="ru-RU" sz="2400" b="1" dirty="0">
@@ -25259,7 +26893,7 @@
                 <a:ea typeface="Roboto" pitchFamily="2" charset="0"/>
                 <a:sym typeface="Calibri"/>
               </a:rPr>
-              <a:t>то есть общая асимптотика алгоритма составит </a:t>
+              <a:t>))=O(n^3</a:t>
             </a:r>
             <a:r>
               <a:rPr lang="ru-RU" sz="2400" b="1" dirty="0" smtClean="0">
@@ -25270,29 +26904,7 @@
                 <a:ea typeface="Roboto" pitchFamily="2" charset="0"/>
                 <a:sym typeface="Calibri"/>
               </a:rPr>
-              <a:t>O(n(m+n^2</a:t>
-            </a:r>
-            <a:r>
-              <a:rPr lang="ru-RU" sz="2400" b="1" dirty="0">
-                <a:solidFill>
-                  <a:srgbClr val="023A84"/>
-                </a:solidFill>
-                <a:latin typeface="+mj-lt"/>
-                <a:ea typeface="Roboto" pitchFamily="2" charset="0"/>
-                <a:sym typeface="Calibri"/>
-              </a:rPr>
-              <a:t>))=</a:t>
-            </a:r>
-            <a:r>
-              <a:rPr lang="ru-RU" sz="2400" b="1" dirty="0" smtClean="0">
-                <a:solidFill>
-                  <a:srgbClr val="023A84"/>
-                </a:solidFill>
-                <a:latin typeface="+mj-lt"/>
-                <a:ea typeface="Roboto" pitchFamily="2" charset="0"/>
-                <a:sym typeface="Calibri"/>
-              </a:rPr>
-              <a:t>O(n^3).</a:t>
+              <a:t>).</a:t>
             </a:r>
             <a:endParaRPr lang="ru-RU" sz="2400" b="1" dirty="0">
               <a:solidFill>
@@ -25628,6 +27240,56 @@
           </a:p>
         </p:txBody>
       </p:sp>
+      <p:sp>
+        <p:nvSpPr>
+          <p:cNvPr id="16" name="Прямоугольник 15">
+            <a:extLst>
+              <a:ext uri="{FF2B5EF4-FFF2-40B4-BE49-F238E27FC236}">
+                <a16:creationId xmlns:a16="http://schemas.microsoft.com/office/drawing/2014/main" id="{51EB4197-7888-4B6B-A423-9EFFA379FE9E}"/>
+              </a:ext>
+            </a:extLst>
+          </p:cNvPr>
+          <p:cNvSpPr/>
+          <p:nvPr/>
+        </p:nvSpPr>
+        <p:spPr>
+          <a:xfrm>
+            <a:off x="180975" y="6366139"/>
+            <a:ext cx="338009" cy="338554"/>
+          </a:xfrm>
+          <a:prstGeom prst="rect">
+            <a:avLst/>
+          </a:prstGeom>
+        </p:spPr>
+        <p:txBody>
+          <a:bodyPr wrap="square">
+            <a:spAutoFit/>
+          </a:bodyPr>
+          <a:lstStyle/>
+          <a:p>
+            <a:pPr lvl="0"/>
+            <a:r>
+              <a:rPr lang="ru-RU" sz="1600" b="1" dirty="0">
+                <a:solidFill>
+                  <a:srgbClr val="023A84"/>
+                </a:solidFill>
+                <a:latin typeface="+mj-lt"/>
+                <a:ea typeface="Roboto" pitchFamily="2" charset="0"/>
+                <a:sym typeface="Calibri"/>
+              </a:rPr>
+              <a:t>5</a:t>
+            </a:r>
+            <a:endParaRPr lang="ru-RU" sz="1600" b="1" dirty="0" smtClean="0">
+              <a:solidFill>
+                <a:srgbClr val="023A84"/>
+              </a:solidFill>
+              <a:latin typeface="+mj-lt"/>
+              <a:ea typeface="Roboto" pitchFamily="2" charset="0"/>
+              <a:sym typeface="Calibri"/>
+            </a:endParaRPr>
+          </a:p>
+        </p:txBody>
+      </p:sp>
     </p:spTree>
     <p:extLst>
       <p:ext uri="{BB962C8B-B14F-4D97-AF65-F5344CB8AC3E}">
@@ -25638,6 +27300,13 @@
   <p:clrMapOvr>
     <a:masterClrMapping/>
   </p:clrMapOvr>
+  <p:timing>
+    <p:tnLst>
+      <p:par>
+        <p:cTn id="1" dur="indefinite" restart="never" nodeType="tmRoot"/>
+      </p:par>
+    </p:tnLst>
+  </p:timing>
 </p:sld>
 </file>
 
@@ -25793,7 +27462,7 @@
           <a:p>
             <a:pPr lvl="0"/>
             <a:r>
-              <a:rPr lang="ru-RU" sz="2400" b="1" dirty="0">
+              <a:rPr lang="ru-RU" sz="2400" b="1" dirty="0" smtClean="0">
                 <a:solidFill>
                   <a:srgbClr val="023A84"/>
                 </a:solidFill>
@@ -25801,7 +27470,18 @@
                 <a:ea typeface="Roboto" pitchFamily="2" charset="0"/>
                 <a:sym typeface="Calibri"/>
               </a:rPr>
-              <a:t> Мы сможем найти максимальное </a:t>
+              <a:t>Мы </a:t>
+            </a:r>
+            <a:r>
+              <a:rPr lang="ru-RU" sz="2400" b="1" dirty="0">
+                <a:solidFill>
+                  <a:srgbClr val="023A84"/>
+                </a:solidFill>
+                <a:latin typeface="+mj-lt"/>
+                <a:ea typeface="Roboto" pitchFamily="2" charset="0"/>
+                <a:sym typeface="Calibri"/>
+              </a:rPr>
+              <a:t>сможем найти максимальное </a:t>
             </a:r>
             <a:r>
               <a:rPr lang="ru-RU" sz="2400" b="1" dirty="0" smtClean="0">
@@ -25858,7 +27538,7 @@
           <a:p>
             <a:pPr lvl="0"/>
             <a:r>
-              <a:rPr lang="ru-RU" sz="2400" b="1" dirty="0" smtClean="0">
+              <a:rPr lang="ru-RU" sz="2400" b="1" u="sng" dirty="0" smtClean="0">
                 <a:solidFill>
                   <a:srgbClr val="023A84"/>
                 </a:solidFill>
@@ -25866,10 +27546,10 @@
                 <a:ea typeface="Roboto" pitchFamily="2" charset="0"/>
                 <a:sym typeface="Calibri"/>
               </a:rPr>
-              <a:t>Дополняющий путь - чередующаяся </a:t>
+              <a:t>Дополняющий путь </a:t>
             </a:r>
             <a:r>
-              <a:rPr lang="ru-RU" sz="2400" b="1" dirty="0">
+              <a:rPr lang="ru-RU" sz="2400" b="1" dirty="0" smtClean="0">
                 <a:solidFill>
                   <a:srgbClr val="023A84"/>
                 </a:solidFill>
@@ -25877,7 +27557,29 @@
                 <a:ea typeface="Roboto" pitchFamily="2" charset="0"/>
                 <a:sym typeface="Calibri"/>
               </a:rPr>
-              <a:t>цепь, которая начинается и кончается голыми </a:t>
+              <a:t>- чередующаяся </a:t>
+            </a:r>
+            <a:r>
+              <a:rPr lang="ru-RU" sz="2400" b="1" dirty="0">
+                <a:solidFill>
+                  <a:srgbClr val="023A84"/>
+                </a:solidFill>
+                <a:latin typeface="+mj-lt"/>
+                <a:ea typeface="Roboto" pitchFamily="2" charset="0"/>
+                <a:sym typeface="Calibri"/>
+              </a:rPr>
+              <a:t>цепь, которая начинается и кончается </a:t>
+            </a:r>
+            <a:r>
+              <a:rPr lang="ru-RU" sz="2400" b="1" dirty="0" smtClean="0">
+                <a:solidFill>
+                  <a:srgbClr val="023A84"/>
+                </a:solidFill>
+                <a:latin typeface="+mj-lt"/>
+                <a:ea typeface="Roboto" pitchFamily="2" charset="0"/>
+                <a:sym typeface="Calibri"/>
+              </a:rPr>
+              <a:t>свободными </a:t>
             </a:r>
             <a:r>
               <a:rPr lang="ru-RU" sz="2400" b="1" dirty="0" smtClean="0">
@@ -25915,7 +27617,7 @@
         </p:nvSpPr>
         <p:spPr>
           <a:xfrm>
-            <a:off x="687602" y="1583583"/>
+            <a:off x="687602" y="1633011"/>
             <a:ext cx="11124356" cy="584775"/>
           </a:xfrm>
           <a:prstGeom prst="rect">
@@ -26137,6 +27839,48 @@
           </a:ln>
         </p:spPr>
       </p:cxnSp>
+      <p:sp>
+        <p:nvSpPr>
+          <p:cNvPr id="11" name="Прямоугольник 10">
+            <a:extLst>
+              <a:ext uri="{FF2B5EF4-FFF2-40B4-BE49-F238E27FC236}">
+                <a16:creationId xmlns:a16="http://schemas.microsoft.com/office/drawing/2014/main" id="{51EB4197-7888-4B6B-A423-9EFFA379FE9E}"/>
+              </a:ext>
+            </a:extLst>
+          </p:cNvPr>
+          <p:cNvSpPr/>
+          <p:nvPr/>
+        </p:nvSpPr>
+        <p:spPr>
+          <a:xfrm>
+            <a:off x="180975" y="6366139"/>
+            <a:ext cx="338009" cy="338554"/>
+          </a:xfrm>
+          <a:prstGeom prst="rect">
+            <a:avLst/>
+          </a:prstGeom>
+        </p:spPr>
+        <p:txBody>
+          <a:bodyPr wrap="square">
+            <a:spAutoFit/>
+          </a:bodyPr>
+          <a:lstStyle/>
+          <a:p>
+            <a:pPr lvl="0"/>
+            <a:r>
+              <a:rPr lang="ru-RU" sz="1600" b="1" dirty="0" smtClean="0">
+                <a:solidFill>
+                  <a:srgbClr val="023A84"/>
+                </a:solidFill>
+                <a:latin typeface="+mj-lt"/>
+                <a:ea typeface="Roboto" pitchFamily="2" charset="0"/>
+                <a:sym typeface="Calibri"/>
+              </a:rPr>
+              <a:t>6</a:t>
+            </a:r>
+          </a:p>
+        </p:txBody>
+      </p:sp>
     </p:spTree>
     <p:extLst>
       <p:ext uri="{BB962C8B-B14F-4D97-AF65-F5344CB8AC3E}">
@@ -26147,6 +27891,13 @@
   <p:clrMapOvr>
     <a:masterClrMapping/>
   </p:clrMapOvr>
+  <p:timing>
+    <p:tnLst>
+      <p:par>
+        <p:cTn id="1" dur="indefinite" restart="never" nodeType="tmRoot"/>
+      </p:par>
+    </p:tnLst>
+  </p:timing>
 </p:sld>
 </file>
 
@@ -26287,8 +28038,8 @@
         </p:nvSpPr>
         <p:spPr>
           <a:xfrm>
-            <a:off x="1768907" y="3463625"/>
-            <a:ext cx="9709116" cy="1200329"/>
+            <a:off x="1664859" y="3094294"/>
+            <a:ext cx="6139417" cy="1938992"/>
           </a:xfrm>
           <a:prstGeom prst="rect">
             <a:avLst/>
@@ -26562,6 +28313,85 @@
           </a:ln>
         </p:spPr>
       </p:cxnSp>
+      <p:pic>
+        <p:nvPicPr>
+          <p:cNvPr id="2" name="Рисунок 1"/>
+          <p:cNvPicPr>
+            <a:picLocks noChangeAspect="1"/>
+          </p:cNvPicPr>
+          <p:nvPr/>
+        </p:nvPicPr>
+        <p:blipFill rotWithShape="1">
+          <a:blip r:embed="rId2">
+            <a:extLst>
+              <a:ext uri="{28A0092B-C50C-407E-A947-70E740481C1C}">
+                <a14:useLocalDpi xmlns:a14="http://schemas.microsoft.com/office/drawing/2010/main" val="0"/>
+              </a:ext>
+            </a:extLst>
+          </a:blip>
+          <a:srcRect l="7624" t="910" r="9257" b="-910"/>
+          <a:stretch/>
+        </p:blipFill>
+        <p:spPr>
+          <a:xfrm>
+            <a:off x="7706010" y="2267814"/>
+            <a:ext cx="3999958" cy="3358630"/>
+          </a:xfrm>
+          <a:prstGeom prst="rect">
+            <a:avLst/>
+          </a:prstGeom>
+        </p:spPr>
+      </p:pic>
+      <p:sp>
+        <p:nvSpPr>
+          <p:cNvPr id="14" name="Прямоугольник 13">
+            <a:extLst>
+              <a:ext uri="{FF2B5EF4-FFF2-40B4-BE49-F238E27FC236}">
+                <a16:creationId xmlns:a16="http://schemas.microsoft.com/office/drawing/2014/main" id="{51EB4197-7888-4B6B-A423-9EFFA379FE9E}"/>
+              </a:ext>
+            </a:extLst>
+          </p:cNvPr>
+          <p:cNvSpPr/>
+          <p:nvPr/>
+        </p:nvSpPr>
+        <p:spPr>
+          <a:xfrm>
+            <a:off x="180975" y="6366139"/>
+            <a:ext cx="338009" cy="338554"/>
+          </a:xfrm>
+          <a:prstGeom prst="rect">
+            <a:avLst/>
+          </a:prstGeom>
+        </p:spPr>
+        <p:txBody>
+          <a:bodyPr wrap="square">
+            <a:spAutoFit/>
+          </a:bodyPr>
+          <a:lstStyle/>
+          <a:p>
+            <a:pPr lvl="0"/>
+            <a:r>
+              <a:rPr lang="ru-RU" sz="1600" b="1" dirty="0">
+                <a:solidFill>
+                  <a:srgbClr val="023A84"/>
+                </a:solidFill>
+                <a:latin typeface="+mj-lt"/>
+                <a:ea typeface="Roboto" pitchFamily="2" charset="0"/>
+                <a:sym typeface="Calibri"/>
+              </a:rPr>
+              <a:t>7</a:t>
+            </a:r>
+            <a:endParaRPr lang="ru-RU" sz="1600" b="1" dirty="0" smtClean="0">
+              <a:solidFill>
+                <a:srgbClr val="023A84"/>
+              </a:solidFill>
+              <a:latin typeface="+mj-lt"/>
+              <a:ea typeface="Roboto" pitchFamily="2" charset="0"/>
+              <a:sym typeface="Calibri"/>
+            </a:endParaRPr>
+          </a:p>
+        </p:txBody>
+      </p:sp>
     </p:spTree>
     <p:extLst>
       <p:ext uri="{BB962C8B-B14F-4D97-AF65-F5344CB8AC3E}">
@@ -26572,6 +28402,13 @@
   <p:clrMapOvr>
     <a:masterClrMapping/>
   </p:clrMapOvr>
+  <p:timing>
+    <p:tnLst>
+      <p:par>
+        <p:cTn id="1" dur="indefinite" restart="never" nodeType="tmRoot"/>
+      </p:par>
+    </p:tnLst>
+  </p:timing>
 </p:sld>
 </file>
 
@@ -26592,6 +28429,70 @@
           <a:chExt cx="0" cy="0"/>
         </a:xfrm>
       </p:grpSpPr>
+      <p:sp>
+        <p:nvSpPr>
+          <p:cNvPr id="11" name="Google Shape;116;p16">
+            <a:extLst>
+              <a:ext uri="{FF2B5EF4-FFF2-40B4-BE49-F238E27FC236}">
+                <a16:creationId xmlns:a16="http://schemas.microsoft.com/office/drawing/2014/main" id="{7AA952F0-A064-4726-955A-D3337EE6D9C4}"/>
+              </a:ext>
+            </a:extLst>
+          </p:cNvPr>
+          <p:cNvSpPr/>
+          <p:nvPr/>
+        </p:nvSpPr>
+        <p:spPr>
+          <a:xfrm>
+            <a:off x="1085716" y="2975095"/>
+            <a:ext cx="1993556" cy="1870789"/>
+          </a:xfrm>
+          <a:prstGeom prst="ellipse">
+            <a:avLst/>
+          </a:prstGeom>
+          <a:solidFill>
+            <a:srgbClr val="BBD6EE">
+              <a:alpha val="49410"/>
+            </a:srgbClr>
+          </a:solidFill>
+          <a:ln>
+            <a:noFill/>
+          </a:ln>
+        </p:spPr>
+        <p:txBody>
+          <a:bodyPr spcFirstLastPara="1" wrap="square" lIns="91425" tIns="45700" rIns="91425" bIns="45700" anchor="ctr" anchorCtr="0">
+            <a:noAutofit/>
+          </a:bodyPr>
+          <a:lstStyle/>
+          <a:p>
+            <a:pPr marL="0" marR="0" lvl="0" indent="0" algn="ctr" rtl="0">
+              <a:lnSpc>
+                <a:spcPct val="100000"/>
+              </a:lnSpc>
+              <a:spcBef>
+                <a:spcPts val="0"/>
+              </a:spcBef>
+              <a:spcAft>
+                <a:spcPts val="0"/>
+              </a:spcAft>
+              <a:buClr>
+                <a:srgbClr val="000000"/>
+              </a:buClr>
+              <a:buSzPts val="1800"/>
+              <a:buFont typeface="Arial"/>
+              <a:buNone/>
+            </a:pPr>
+            <a:endParaRPr sz="2400" b="0" i="0" u="none" strike="noStrike" cap="none">
+              <a:solidFill>
+                <a:srgbClr val="FFFFFF"/>
+              </a:solidFill>
+              <a:latin typeface="Calibri"/>
+              <a:ea typeface="Calibri"/>
+              <a:cs typeface="Calibri"/>
+              <a:sym typeface="Calibri"/>
+            </a:endParaRPr>
+          </a:p>
+        </p:txBody>
+      </p:sp>
       <p:sp>
         <p:nvSpPr>
           <p:cNvPr id="3" name="Google Shape;154;gb6f6fa0e72_1_0"/>
@@ -26693,6 +28594,70 @@
               </a:solidFill>
               <a:latin typeface="+mj-lt"/>
               <a:ea typeface="Roboto" pitchFamily="2" charset="0"/>
+              <a:sym typeface="Calibri"/>
+            </a:endParaRPr>
+          </a:p>
+        </p:txBody>
+      </p:sp>
+      <p:sp>
+        <p:nvSpPr>
+          <p:cNvPr id="12" name="Google Shape;116;p16">
+            <a:extLst>
+              <a:ext uri="{FF2B5EF4-FFF2-40B4-BE49-F238E27FC236}">
+                <a16:creationId xmlns:a16="http://schemas.microsoft.com/office/drawing/2014/main" id="{7AA952F0-A064-4726-955A-D3337EE6D9C4}"/>
+              </a:ext>
+            </a:extLst>
+          </p:cNvPr>
+          <p:cNvSpPr/>
+          <p:nvPr/>
+        </p:nvSpPr>
+        <p:spPr>
+          <a:xfrm>
+            <a:off x="1300426" y="3204519"/>
+            <a:ext cx="839249" cy="787566"/>
+          </a:xfrm>
+          <a:prstGeom prst="ellipse">
+            <a:avLst/>
+          </a:prstGeom>
+          <a:solidFill>
+            <a:srgbClr val="BBD6EE">
+              <a:alpha val="49410"/>
+            </a:srgbClr>
+          </a:solidFill>
+          <a:ln>
+            <a:noFill/>
+          </a:ln>
+        </p:spPr>
+        <p:txBody>
+          <a:bodyPr spcFirstLastPara="1" wrap="square" lIns="91425" tIns="45700" rIns="91425" bIns="45700" anchor="ctr" anchorCtr="0">
+            <a:noAutofit/>
+          </a:bodyPr>
+          <a:lstStyle/>
+          <a:p>
+            <a:pPr marL="0" marR="0" lvl="0" indent="0" algn="ctr" rtl="0">
+              <a:lnSpc>
+                <a:spcPct val="100000"/>
+              </a:lnSpc>
+              <a:spcBef>
+                <a:spcPts val="0"/>
+              </a:spcBef>
+              <a:spcAft>
+                <a:spcPts val="0"/>
+              </a:spcAft>
+              <a:buClr>
+                <a:srgbClr val="000000"/>
+              </a:buClr>
+              <a:buSzPts val="1800"/>
+              <a:buFont typeface="Arial"/>
+              <a:buNone/>
+            </a:pPr>
+            <a:endParaRPr sz="2400" b="0" i="0" u="none" strike="noStrike" cap="none">
+              <a:solidFill>
+                <a:srgbClr val="FFFFFF"/>
+              </a:solidFill>
+              <a:latin typeface="Calibri"/>
+              <a:ea typeface="Calibri"/>
+              <a:cs typeface="Calibri"/>
               <a:sym typeface="Calibri"/>
             </a:endParaRPr>
           </a:p>
@@ -27328,6 +29293,48 @@
           </p:txBody>
         </p:sp>
       </p:grpSp>
+      <p:sp>
+        <p:nvSpPr>
+          <p:cNvPr id="13" name="Прямоугольник 12">
+            <a:extLst>
+              <a:ext uri="{FF2B5EF4-FFF2-40B4-BE49-F238E27FC236}">
+                <a16:creationId xmlns:a16="http://schemas.microsoft.com/office/drawing/2014/main" id="{51EB4197-7888-4B6B-A423-9EFFA379FE9E}"/>
+              </a:ext>
+            </a:extLst>
+          </p:cNvPr>
+          <p:cNvSpPr/>
+          <p:nvPr/>
+        </p:nvSpPr>
+        <p:spPr>
+          <a:xfrm>
+            <a:off x="180975" y="6366139"/>
+            <a:ext cx="338009" cy="338554"/>
+          </a:xfrm>
+          <a:prstGeom prst="rect">
+            <a:avLst/>
+          </a:prstGeom>
+        </p:spPr>
+        <p:txBody>
+          <a:bodyPr wrap="square">
+            <a:spAutoFit/>
+          </a:bodyPr>
+          <a:lstStyle/>
+          <a:p>
+            <a:pPr lvl="0"/>
+            <a:r>
+              <a:rPr lang="ru-RU" sz="1600" b="1" dirty="0" smtClean="0">
+                <a:solidFill>
+                  <a:srgbClr val="023A84"/>
+                </a:solidFill>
+                <a:latin typeface="+mj-lt"/>
+                <a:ea typeface="Roboto" pitchFamily="2" charset="0"/>
+                <a:sym typeface="Calibri"/>
+              </a:rPr>
+              <a:t>8</a:t>
+            </a:r>
+          </a:p>
+        </p:txBody>
+      </p:sp>
     </p:spTree>
     <p:extLst>
       <p:ext uri="{BB962C8B-B14F-4D97-AF65-F5344CB8AC3E}">
@@ -27338,6 +29345,13 @@
   <p:clrMapOvr>
     <a:masterClrMapping/>
   </p:clrMapOvr>
+  <p:timing>
+    <p:tnLst>
+      <p:par>
+        <p:cTn id="1" dur="indefinite" restart="never" nodeType="tmRoot"/>
+      </p:par>
+    </p:tnLst>
+  </p:timing>
 </p:sld>
 </file>
 
@@ -27360,27 +29374,35 @@
       </p:grpSpPr>
       <p:sp>
         <p:nvSpPr>
-          <p:cNvPr id="3" name="Google Shape;154;gb6f6fa0e72_1_0"/>
+          <p:cNvPr id="11" name="Google Shape;116;p16">
+            <a:extLst>
+              <a:ext uri="{FF2B5EF4-FFF2-40B4-BE49-F238E27FC236}">
+                <a16:creationId xmlns:a16="http://schemas.microsoft.com/office/drawing/2014/main" id="{7AA952F0-A064-4726-955A-D3337EE6D9C4}"/>
+              </a:ext>
+            </a:extLst>
+          </p:cNvPr>
           <p:cNvSpPr/>
           <p:nvPr/>
         </p:nvSpPr>
         <p:spPr>
-          <a:xfrm rot="5400000">
-            <a:off x="5387545" y="-5387546"/>
-            <a:ext cx="1416908" cy="12192001"/>
+          <a:xfrm>
+            <a:off x="3039763" y="1677454"/>
+            <a:ext cx="1993556" cy="1870789"/>
           </a:xfrm>
-          <a:prstGeom prst="rect">
+          <a:prstGeom prst="ellipse">
             <a:avLst/>
           </a:prstGeom>
           <a:solidFill>
-            <a:srgbClr val="023A84"/>
+            <a:srgbClr val="BBD6EE">
+              <a:alpha val="49410"/>
+            </a:srgbClr>
           </a:solidFill>
           <a:ln>
             <a:noFill/>
           </a:ln>
         </p:spPr>
         <p:txBody>
-          <a:bodyPr spcFirstLastPara="1" wrap="square" lIns="91425" tIns="91425" rIns="91425" bIns="91425" anchor="ctr" anchorCtr="0">
+          <a:bodyPr spcFirstLastPara="1" wrap="square" lIns="91425" tIns="45700" rIns="91425" bIns="45700" anchor="ctr" anchorCtr="0">
             <a:noAutofit/>
           </a:bodyPr>
           <a:lstStyle/>
@@ -27398,18 +29420,18 @@
               <a:buClr>
                 <a:srgbClr val="000000"/>
               </a:buClr>
-              <a:buSzPts val="1400"/>
+              <a:buSzPts val="1800"/>
               <a:buFont typeface="Arial"/>
               <a:buNone/>
             </a:pPr>
-            <a:endParaRPr sz="1400" b="0" i="0" u="none" strike="noStrike" cap="none" dirty="0">
+            <a:endParaRPr sz="2400" b="0" i="0" u="none" strike="noStrike" cap="none">
               <a:solidFill>
-                <a:srgbClr val="000000"/>
+                <a:srgbClr val="FFFFFF"/>
               </a:solidFill>
-              <a:latin typeface="+mj-lt"/>
-              <a:ea typeface="Arial"/>
-              <a:cs typeface="Arial"/>
-              <a:sym typeface="Arial"/>
+              <a:latin typeface="Calibri"/>
+              <a:ea typeface="Calibri"/>
+              <a:cs typeface="Calibri"/>
+              <a:sym typeface="Calibri"/>
             </a:endParaRPr>
           </a:p>
         </p:txBody>
@@ -27478,8 +29500,8 @@
         </p:nvSpPr>
         <p:spPr>
           <a:xfrm>
-            <a:off x="687602" y="1583583"/>
-            <a:ext cx="11124356" cy="584775"/>
+            <a:off x="603402" y="1929243"/>
+            <a:ext cx="3993310" cy="2308324"/>
           </a:xfrm>
           <a:prstGeom prst="rect">
             <a:avLst/>
@@ -27491,9 +29513,9 @@
           </a:bodyPr>
           <a:lstStyle/>
           <a:p>
-            <a:pPr lvl="0"/>
+            <a:pPr lvl="0" algn="r"/>
             <a:r>
-              <a:rPr lang="ru-RU" sz="3200" b="1" dirty="0">
+              <a:rPr lang="ru-RU" sz="4800" b="1" dirty="0" smtClean="0">
                 <a:solidFill>
                   <a:srgbClr val="023A84"/>
                 </a:solidFill>
@@ -27501,8 +29523,55 @@
                 <a:ea typeface="Roboto" pitchFamily="2" charset="0"/>
                 <a:sym typeface="Calibri"/>
               </a:rPr>
-              <a:t>Общая схема алгоритма</a:t>
+              <a:t>Общая</a:t>
             </a:r>
+          </a:p>
+          <a:p>
+            <a:pPr lvl="0" algn="r"/>
+            <a:r>
+              <a:rPr lang="ru-RU" sz="4800" b="1" dirty="0">
+                <a:solidFill>
+                  <a:srgbClr val="023A84"/>
+                </a:solidFill>
+                <a:latin typeface="+mj-lt"/>
+                <a:ea typeface="Roboto" pitchFamily="2" charset="0"/>
+                <a:sym typeface="Calibri"/>
+              </a:rPr>
+              <a:t>с</a:t>
+            </a:r>
+            <a:r>
+              <a:rPr lang="ru-RU" sz="4800" b="1" dirty="0" smtClean="0">
+                <a:solidFill>
+                  <a:srgbClr val="023A84"/>
+                </a:solidFill>
+                <a:latin typeface="+mj-lt"/>
+                <a:ea typeface="Roboto" pitchFamily="2" charset="0"/>
+                <a:sym typeface="Calibri"/>
+              </a:rPr>
+              <a:t>хема</a:t>
+            </a:r>
+          </a:p>
+          <a:p>
+            <a:pPr lvl="0" algn="r"/>
+            <a:r>
+              <a:rPr lang="ru-RU" sz="4800" b="1" dirty="0" smtClean="0">
+                <a:solidFill>
+                  <a:srgbClr val="023A84"/>
+                </a:solidFill>
+                <a:latin typeface="+mj-lt"/>
+                <a:ea typeface="Roboto" pitchFamily="2" charset="0"/>
+                <a:sym typeface="Calibri"/>
+              </a:rPr>
+              <a:t>алгоритма</a:t>
+            </a:r>
+            <a:endParaRPr lang="ru-RU" sz="4800" b="1" dirty="0">
+              <a:solidFill>
+                <a:srgbClr val="023A84"/>
+              </a:solidFill>
+              <a:latin typeface="+mj-lt"/>
+              <a:ea typeface="Roboto" pitchFamily="2" charset="0"/>
+              <a:sym typeface="Calibri"/>
+            </a:endParaRPr>
           </a:p>
         </p:txBody>
       </p:sp>
@@ -27520,7 +29589,7 @@
         </p:nvSpPr>
         <p:spPr>
           <a:xfrm>
-            <a:off x="0" y="1338436"/>
+            <a:off x="0" y="110154"/>
             <a:ext cx="11616920" cy="298223"/>
           </a:xfrm>
           <a:prstGeom prst="rightArrow">
@@ -27571,7 +29640,7 @@
       </p:sp>
       <p:pic>
         <p:nvPicPr>
-          <p:cNvPr id="2" name="Рисунок 1"/>
+          <p:cNvPr id="4" name="Рисунок 3"/>
           <p:cNvPicPr>
             <a:picLocks noChangeAspect="1"/>
           </p:cNvPicPr>
@@ -27591,78 +29660,64 @@
         </p:blipFill>
         <p:spPr>
           <a:xfrm>
-            <a:off x="1784057" y="2581446"/>
-            <a:ext cx="8048805" cy="3680282"/>
+            <a:off x="5469924" y="569424"/>
+            <a:ext cx="4234249" cy="6042517"/>
           </a:xfrm>
           <a:prstGeom prst="rect">
             <a:avLst/>
           </a:prstGeom>
         </p:spPr>
       </p:pic>
-      <p:cxnSp>
-        <p:nvCxnSpPr>
-          <p:cNvPr id="12" name="Google Shape;125;p16">
+      <p:sp>
+        <p:nvSpPr>
+          <p:cNvPr id="14" name="Прямоугольник 13">
             <a:extLst>
               <a:ext uri="{FF2B5EF4-FFF2-40B4-BE49-F238E27FC236}">
-                <a16:creationId xmlns:a16="http://schemas.microsoft.com/office/drawing/2014/main" id="{469277B3-3964-4189-8F8F-A08BD17A34CD}"/>
+                <a16:creationId xmlns:a16="http://schemas.microsoft.com/office/drawing/2014/main" id="{51EB4197-7888-4B6B-A423-9EFFA379FE9E}"/>
               </a:ext>
             </a:extLst>
           </p:cNvPr>
-          <p:cNvCxnSpPr/>
+          <p:cNvSpPr/>
           <p:nvPr/>
-        </p:nvCxnSpPr>
+        </p:nvSpPr>
         <p:spPr>
-          <a:xfrm flipH="1">
-            <a:off x="331734" y="2373976"/>
-            <a:ext cx="11285186" cy="0"/>
+          <a:xfrm>
+            <a:off x="180975" y="6366139"/>
+            <a:ext cx="338009" cy="338554"/>
           </a:xfrm>
-          <a:prstGeom prst="straightConnector1">
+          <a:prstGeom prst="rect">
             <a:avLst/>
           </a:prstGeom>
-          <a:noFill/>
-          <a:ln w="9525" cap="flat" cmpd="sng">
-            <a:solidFill>
-              <a:schemeClr val="dk2"/>
-            </a:solidFill>
-            <a:prstDash val="dot"/>
-            <a:round/>
-            <a:headEnd type="none" w="sm" len="sm"/>
-            <a:tailEnd type="none" w="sm" len="sm"/>
-          </a:ln>
         </p:spPr>
-      </p:cxnSp>
-      <p:cxnSp>
-        <p:nvCxnSpPr>
-          <p:cNvPr id="13" name="Google Shape;125;p16">
-            <a:extLst>
-              <a:ext uri="{FF2B5EF4-FFF2-40B4-BE49-F238E27FC236}">
-                <a16:creationId xmlns:a16="http://schemas.microsoft.com/office/drawing/2014/main" id="{469277B3-3964-4189-8F8F-A08BD17A34CD}"/>
-              </a:ext>
-            </a:extLst>
-          </p:cNvPr>
-          <p:cNvCxnSpPr/>
-          <p:nvPr/>
-        </p:nvCxnSpPr>
-        <p:spPr>
-          <a:xfrm flipH="1">
-            <a:off x="422171" y="6603398"/>
-            <a:ext cx="11285186" cy="0"/>
-          </a:xfrm>
-          <a:prstGeom prst="straightConnector1">
-            <a:avLst/>
-          </a:prstGeom>
-          <a:noFill/>
-          <a:ln w="9525" cap="flat" cmpd="sng">
-            <a:solidFill>
-              <a:schemeClr val="dk2"/>
-            </a:solidFill>
-            <a:prstDash val="dot"/>
-            <a:round/>
-            <a:headEnd type="none" w="sm" len="sm"/>
-            <a:tailEnd type="none" w="sm" len="sm"/>
-          </a:ln>
-        </p:spPr>
-      </p:cxnSp>
+        <p:txBody>
+          <a:bodyPr wrap="square">
+            <a:spAutoFit/>
+          </a:bodyPr>
+          <a:lstStyle/>
+          <a:p>
+            <a:pPr lvl="0"/>
+            <a:r>
+              <a:rPr lang="ru-RU" sz="1600" b="1" dirty="0">
+                <a:solidFill>
+                  <a:srgbClr val="023A84"/>
+                </a:solidFill>
+                <a:latin typeface="+mj-lt"/>
+                <a:ea typeface="Roboto" pitchFamily="2" charset="0"/>
+                <a:sym typeface="Calibri"/>
+              </a:rPr>
+              <a:t>9</a:t>
+            </a:r>
+            <a:endParaRPr lang="ru-RU" sz="1600" b="1" dirty="0" smtClean="0">
+              <a:solidFill>
+                <a:srgbClr val="023A84"/>
+              </a:solidFill>
+              <a:latin typeface="+mj-lt"/>
+              <a:ea typeface="Roboto" pitchFamily="2" charset="0"/>
+              <a:sym typeface="Calibri"/>
+            </a:endParaRPr>
+          </a:p>
+        </p:txBody>
+      </p:sp>
     </p:spTree>
     <p:extLst>
       <p:ext uri="{BB962C8B-B14F-4D97-AF65-F5344CB8AC3E}">
@@ -27673,6 +29728,13 @@
   <p:clrMapOvr>
     <a:masterClrMapping/>
   </p:clrMapOvr>
+  <p:timing>
+    <p:tnLst>
+      <p:par>
+        <p:cTn id="1" dur="indefinite" restart="never" nodeType="tmRoot"/>
+      </p:par>
+    </p:tnLst>
+  </p:timing>
 </p:sld>
 </file>
 

</xml_diff>